<commit_message>
Expand Background section for presentation
</commit_message>
<xml_diff>
--- a/Talk/Thread Scheduler Efficiency Improvements.pptx
+++ b/Talk/Thread Scheduler Efficiency Improvements.pptx
@@ -6,19 +6,28 @@
   </p:sldMasterIdLst>
   <p:sldIdLst>
     <p:sldId id="256" r:id="rId2"/>
-    <p:sldId id="260" r:id="rId3"/>
-    <p:sldId id="257" r:id="rId4"/>
+    <p:sldId id="257" r:id="rId3"/>
+    <p:sldId id="260" r:id="rId4"/>
     <p:sldId id="258" r:id="rId5"/>
-    <p:sldId id="259" r:id="rId6"/>
-    <p:sldId id="263" r:id="rId7"/>
-    <p:sldId id="269" r:id="rId8"/>
-    <p:sldId id="266" r:id="rId9"/>
-    <p:sldId id="267" r:id="rId10"/>
-    <p:sldId id="268" r:id="rId11"/>
-    <p:sldId id="264" r:id="rId12"/>
-    <p:sldId id="262" r:id="rId13"/>
-    <p:sldId id="265" r:id="rId14"/>
-    <p:sldId id="261" r:id="rId15"/>
+    <p:sldId id="271" r:id="rId6"/>
+    <p:sldId id="259" r:id="rId7"/>
+    <p:sldId id="270" r:id="rId8"/>
+    <p:sldId id="273" r:id="rId9"/>
+    <p:sldId id="274" r:id="rId10"/>
+    <p:sldId id="275" r:id="rId11"/>
+    <p:sldId id="277" r:id="rId12"/>
+    <p:sldId id="278" r:id="rId13"/>
+    <p:sldId id="263" r:id="rId14"/>
+    <p:sldId id="269" r:id="rId15"/>
+    <p:sldId id="280" r:id="rId16"/>
+    <p:sldId id="266" r:id="rId17"/>
+    <p:sldId id="267" r:id="rId18"/>
+    <p:sldId id="268" r:id="rId19"/>
+    <p:sldId id="264" r:id="rId20"/>
+    <p:sldId id="262" r:id="rId21"/>
+    <p:sldId id="276" r:id="rId22"/>
+    <p:sldId id="265" r:id="rId23"/>
+    <p:sldId id="261" r:id="rId24"/>
   </p:sldIdLst>
   <p:sldSz cx="12192000" cy="6858000"/>
   <p:notesSz cx="6858000" cy="9144000"/>
@@ -123,20 +132,28 @@
         <p14:section name="Introduction" id="{53D6751A-4BBC-43ED-9CC9-6D8E4BF1B68B}">
           <p14:sldIdLst>
             <p14:sldId id="256"/>
+            <p14:sldId id="257"/>
             <p14:sldId id="260"/>
-            <p14:sldId id="257"/>
             <p14:sldId id="258"/>
+            <p14:sldId id="271"/>
           </p14:sldIdLst>
         </p14:section>
         <p14:section name="Background" id="{8E00A5A9-811E-4AD2-9E49-7F36F648BB12}">
           <p14:sldIdLst>
             <p14:sldId id="259"/>
+            <p14:sldId id="270"/>
+            <p14:sldId id="273"/>
+            <p14:sldId id="274"/>
+            <p14:sldId id="275"/>
+            <p14:sldId id="277"/>
+            <p14:sldId id="278"/>
           </p14:sldIdLst>
         </p14:section>
         <p14:section name="Thread Scheduling" id="{00CE1E52-3006-4789-85CF-82F6973EEF5D}">
           <p14:sldIdLst>
             <p14:sldId id="263"/>
             <p14:sldId id="269"/>
+            <p14:sldId id="280"/>
             <p14:sldId id="266"/>
             <p14:sldId id="267"/>
             <p14:sldId id="268"/>
@@ -153,7 +170,9 @@
           </p14:sldIdLst>
         </p14:section>
         <p14:section name="Shuffler" id="{1D1BDA72-031E-450A-B202-8386D7190F24}">
-          <p14:sldIdLst/>
+          <p14:sldIdLst>
+            <p14:sldId id="276"/>
+          </p14:sldIdLst>
         </p14:section>
         <p14:section name="FLSCHED" id="{F3678A86-281D-40AC-9C05-06E157C3E6A1}">
           <p14:sldIdLst/>
@@ -166,8 +185,15 @@
         </p14:section>
       </p14:sectionLst>
     </p:ext>
+    <p:ext uri="{EFAFB233-063F-42B5-8137-9DF3F51BA10A}">
+      <p15:sldGuideLst xmlns:p15="http://schemas.microsoft.com/office/powerpoint/2012/main"/>
+    </p:ext>
   </p:extLst>
 </p:presentation>
+</file>
+
+<file path=ppt/revisionInfo.xml><?xml version="1.0" encoding="utf-8"?>
+<p1510:revInfo xmlns:a="http://schemas.openxmlformats.org/drawingml/2006/main" xmlns:r="http://schemas.openxmlformats.org/officeDocument/2006/relationships" xmlns:p1510="http://schemas.microsoft.com/office/powerpoint/2015/10/main"/>
 </file>
 
 <file path=ppt/slideLayouts/slideLayout1.xml><?xml version="1.0" encoding="utf-8"?>
@@ -895,7 +921,7 @@
             <a:fld id="{B61BEF0D-F0BB-DE4B-95CE-6DB70DBA9567}" type="datetimeFigureOut">
               <a:rPr lang="en-US" dirty="0"/>
               <a:pPr/>
-              <a:t>10/18/2017</a:t>
+              <a:t>11/9/2017</a:t>
             </a:fld>
             <a:endParaRPr lang="en-US" dirty="0"/>
           </a:p>
@@ -1143,7 +1169,7 @@
             <a:fld id="{B61BEF0D-F0BB-DE4B-95CE-6DB70DBA9567}" type="datetimeFigureOut">
               <a:rPr lang="en-US" dirty="0"/>
               <a:pPr/>
-              <a:t>10/18/2017</a:t>
+              <a:t>11/9/2017</a:t>
             </a:fld>
             <a:endParaRPr lang="en-US" dirty="0"/>
           </a:p>
@@ -1454,7 +1480,7 @@
             <a:fld id="{B61BEF0D-F0BB-DE4B-95CE-6DB70DBA9567}" type="datetimeFigureOut">
               <a:rPr lang="en-US" dirty="0"/>
               <a:pPr/>
-              <a:t>10/18/2017</a:t>
+              <a:t>11/9/2017</a:t>
             </a:fld>
             <a:endParaRPr lang="en-US" dirty="0"/>
           </a:p>
@@ -1778,7 +1804,7 @@
             <a:fld id="{B61BEF0D-F0BB-DE4B-95CE-6DB70DBA9567}" type="datetimeFigureOut">
               <a:rPr lang="en-US" dirty="0"/>
               <a:pPr/>
-              <a:t>10/18/2017</a:t>
+              <a:t>11/9/2017</a:t>
             </a:fld>
             <a:endParaRPr lang="en-US" dirty="0"/>
           </a:p>
@@ -2089,7 +2115,7 @@
             <a:fld id="{B61BEF0D-F0BB-DE4B-95CE-6DB70DBA9567}" type="datetimeFigureOut">
               <a:rPr lang="en-US" dirty="0"/>
               <a:pPr/>
-              <a:t>10/18/2017</a:t>
+              <a:t>11/9/2017</a:t>
             </a:fld>
             <a:endParaRPr lang="en-US" dirty="0"/>
           </a:p>
@@ -2473,7 +2499,7 @@
             <a:fld id="{B61BEF0D-F0BB-DE4B-95CE-6DB70DBA9567}" type="datetimeFigureOut">
               <a:rPr lang="en-US" dirty="0"/>
               <a:pPr/>
-              <a:t>10/18/2017</a:t>
+              <a:t>11/9/2017</a:t>
             </a:fld>
             <a:endParaRPr lang="en-US" dirty="0"/>
           </a:p>
@@ -2639,7 +2665,7 @@
           <a:p>
             <a:fld id="{55C6B4A9-1611-4792-9094-5F34BCA07E0B}" type="datetimeFigureOut">
               <a:rPr lang="en-US" dirty="0"/>
-              <a:t>10/18/2017</a:t>
+              <a:t>11/9/2017</a:t>
             </a:fld>
             <a:endParaRPr lang="en-US" dirty="0"/>
           </a:p>
@@ -2815,7 +2841,7 @@
             <a:fld id="{B61BEF0D-F0BB-DE4B-95CE-6DB70DBA9567}" type="datetimeFigureOut">
               <a:rPr lang="en-US" dirty="0"/>
               <a:pPr/>
-              <a:t>10/18/2017</a:t>
+              <a:t>11/9/2017</a:t>
             </a:fld>
             <a:endParaRPr lang="en-US" dirty="0"/>
           </a:p>
@@ -2988,7 +3014,7 @@
             <a:fld id="{B61BEF0D-F0BB-DE4B-95CE-6DB70DBA9567}" type="datetimeFigureOut">
               <a:rPr lang="en-US" dirty="0"/>
               <a:pPr/>
-              <a:t>10/18/2017</a:t>
+              <a:t>11/9/2017</a:t>
             </a:fld>
             <a:endParaRPr lang="en-US" dirty="0"/>
           </a:p>
@@ -3232,7 +3258,7 @@
             <a:fld id="{B61BEF0D-F0BB-DE4B-95CE-6DB70DBA9567}" type="datetimeFigureOut">
               <a:rPr lang="en-US" dirty="0"/>
               <a:pPr/>
-              <a:t>10/18/2017</a:t>
+              <a:t>11/9/2017</a:t>
             </a:fld>
             <a:endParaRPr lang="en-US" dirty="0"/>
           </a:p>
@@ -3460,7 +3486,7 @@
           <a:p>
             <a:fld id="{EB712588-04B1-427B-82EE-E8DB90309F08}" type="datetimeFigureOut">
               <a:rPr lang="en-US" dirty="0"/>
-              <a:t>10/18/2017</a:t>
+              <a:t>11/9/2017</a:t>
             </a:fld>
             <a:endParaRPr lang="en-US" dirty="0"/>
           </a:p>
@@ -3830,7 +3856,7 @@
             <a:fld id="{B61BEF0D-F0BB-DE4B-95CE-6DB70DBA9567}" type="datetimeFigureOut">
               <a:rPr lang="en-US" dirty="0"/>
               <a:pPr/>
-              <a:t>10/18/2017</a:t>
+              <a:t>11/9/2017</a:t>
             </a:fld>
             <a:endParaRPr lang="en-US" dirty="0"/>
           </a:p>
@@ -3950,7 +3976,7 @@
             <a:fld id="{B61BEF0D-F0BB-DE4B-95CE-6DB70DBA9567}" type="datetimeFigureOut">
               <a:rPr lang="en-US" dirty="0"/>
               <a:pPr/>
-              <a:t>10/18/2017</a:t>
+              <a:t>11/9/2017</a:t>
             </a:fld>
             <a:endParaRPr lang="en-US" dirty="0"/>
           </a:p>
@@ -4042,7 +4068,7 @@
             <a:fld id="{B61BEF0D-F0BB-DE4B-95CE-6DB70DBA9567}" type="datetimeFigureOut">
               <a:rPr lang="en-US" dirty="0"/>
               <a:pPr/>
-              <a:t>10/18/2017</a:t>
+              <a:t>11/9/2017</a:t>
             </a:fld>
             <a:endParaRPr lang="en-US" dirty="0"/>
           </a:p>
@@ -4293,7 +4319,7 @@
           <a:p>
             <a:fld id="{42A54C80-263E-416B-A8E0-580EDEADCBDC}" type="datetimeFigureOut">
               <a:rPr lang="en-US" dirty="0"/>
-              <a:t>10/18/2017</a:t>
+              <a:t>11/9/2017</a:t>
             </a:fld>
             <a:endParaRPr lang="en-US" dirty="0"/>
           </a:p>
@@ -4552,7 +4578,7 @@
             <a:fld id="{B61BEF0D-F0BB-DE4B-95CE-6DB70DBA9567}" type="datetimeFigureOut">
               <a:rPr lang="en-US" dirty="0"/>
               <a:pPr/>
-              <a:t>10/18/2017</a:t>
+              <a:t>11/9/2017</a:t>
             </a:fld>
             <a:endParaRPr lang="en-US" dirty="0"/>
           </a:p>
@@ -5294,7 +5320,7 @@
             <a:fld id="{B61BEF0D-F0BB-DE4B-95CE-6DB70DBA9567}" type="datetimeFigureOut">
               <a:rPr lang="en-US" dirty="0"/>
               <a:pPr/>
-              <a:t>10/18/2017</a:t>
+              <a:t>11/9/2017</a:t>
             </a:fld>
             <a:endParaRPr lang="en-US" dirty="0"/>
           </a:p>
@@ -6236,7 +6262,7 @@
           <p:cNvPr id="2" name="Title 1">
             <a:extLst>
               <a:ext uri="{FF2B5EF4-FFF2-40B4-BE49-F238E27FC236}">
-                <a16:creationId xmlns:a16="http://schemas.microsoft.com/office/drawing/2014/main" id="{5AC9455C-C24E-46B5-8157-7C60F65C59DC}"/>
+                <a16:creationId xmlns:a16="http://schemas.microsoft.com/office/drawing/2014/main" id="{5BDA6342-AA3A-46B0-ACBB-BB87A6998B4F}"/>
               </a:ext>
             </a:extLst>
           </p:cNvPr>
@@ -6247,72 +6273,63 @@
             <p:ph type="title"/>
           </p:nvPr>
         </p:nvSpPr>
-        <p:spPr/>
+        <p:spPr>
+          <a:xfrm>
+            <a:off x="368750" y="299049"/>
+            <a:ext cx="8596668" cy="1320800"/>
+          </a:xfrm>
+        </p:spPr>
         <p:txBody>
           <a:bodyPr/>
           <a:lstStyle/>
           <a:p>
             <a:r>
               <a:rPr lang="en-US" dirty="0"/>
-              <a:t>Multiple </a:t>
-            </a:r>
-            <a:r>
-              <a:rPr lang="en-US" dirty="0" err="1"/>
-              <a:t>Runqueues</a:t>
-            </a:r>
-            <a:endParaRPr lang="en-US" dirty="0"/>
-          </a:p>
-        </p:txBody>
-      </p:sp>
-      <p:sp>
-        <p:nvSpPr>
-          <p:cNvPr id="3" name="Content Placeholder 2">
+              <a:t>Race Condition (example)</a:t>
+            </a:r>
+          </a:p>
+        </p:txBody>
+      </p:sp>
+      <p:pic>
+        <p:nvPicPr>
+          <p:cNvPr id="8" name="Graphic 7">
             <a:extLst>
               <a:ext uri="{FF2B5EF4-FFF2-40B4-BE49-F238E27FC236}">
-                <a16:creationId xmlns:a16="http://schemas.microsoft.com/office/drawing/2014/main" id="{FEED6BAF-D70D-4353-A488-83A8AC526FA7}"/>
+                <a16:creationId xmlns:a16="http://schemas.microsoft.com/office/drawing/2014/main" id="{7C06A372-4100-4967-9614-1E91A07B7FBD}"/>
               </a:ext>
             </a:extLst>
           </p:cNvPr>
-          <p:cNvSpPr>
-            <a:spLocks noGrp="1"/>
-          </p:cNvSpPr>
-          <p:nvPr>
-            <p:ph idx="1"/>
-          </p:nvPr>
-        </p:nvSpPr>
-        <p:spPr/>
-        <p:txBody>
-          <a:bodyPr/>
-          <a:lstStyle/>
-          <a:p>
-            <a:r>
-              <a:rPr lang="en-US" dirty="0"/>
-              <a:t>Context Switching is expensive across cores</a:t>
-            </a:r>
-          </a:p>
-          <a:p>
-            <a:r>
-              <a:rPr lang="en-US" dirty="0"/>
-              <a:t>Multicore systems need multiple </a:t>
-            </a:r>
-            <a:r>
-              <a:rPr lang="en-US" dirty="0" err="1"/>
-              <a:t>runqueues</a:t>
-            </a:r>
-            <a:r>
-              <a:rPr lang="en-US" dirty="0"/>
-              <a:t> to minimize context switches</a:t>
-            </a:r>
-          </a:p>
-          <a:p>
-            <a:endParaRPr lang="en-US" dirty="0"/>
-          </a:p>
-        </p:txBody>
-      </p:sp>
+          <p:cNvPicPr>
+            <a:picLocks noChangeAspect="1"/>
+          </p:cNvPicPr>
+          <p:nvPr/>
+        </p:nvPicPr>
+        <p:blipFill>
+          <a:blip r:embed="rId2">
+            <a:extLst>
+              <a:ext uri="{96DAC541-7B7A-43D3-8B79-37D633B846F1}">
+                <asvg:svgBlip xmlns:asvg="http://schemas.microsoft.com/office/drawing/2016/SVG/main" r:embed="rId3"/>
+              </a:ext>
+            </a:extLst>
+          </a:blip>
+          <a:stretch>
+            <a:fillRect/>
+          </a:stretch>
+        </p:blipFill>
+        <p:spPr>
+          <a:xfrm>
+            <a:off x="2005065" y="959449"/>
+            <a:ext cx="6719806" cy="5762625"/>
+          </a:xfrm>
+          <a:prstGeom prst="rect">
+            <a:avLst/>
+          </a:prstGeom>
+        </p:spPr>
+      </p:pic>
     </p:spTree>
     <p:extLst>
       <p:ext uri="{BB962C8B-B14F-4D97-AF65-F5344CB8AC3E}">
-        <p14:creationId xmlns:p14="http://schemas.microsoft.com/office/powerpoint/2010/main" val="324779882"/>
+        <p14:creationId xmlns:p14="http://schemas.microsoft.com/office/powerpoint/2010/main" val="1959920987"/>
       </p:ext>
     </p:extLst>
   </p:cSld>
@@ -6341,10 +6358,10 @@
       </p:grpSpPr>
       <p:sp>
         <p:nvSpPr>
-          <p:cNvPr id="2" name="Title 1">
+          <p:cNvPr id="3" name="Content Placeholder 2">
             <a:extLst>
               <a:ext uri="{FF2B5EF4-FFF2-40B4-BE49-F238E27FC236}">
-                <a16:creationId xmlns:a16="http://schemas.microsoft.com/office/drawing/2014/main" id="{BDD0509A-6666-45C3-8F03-D2600104FFEE}"/>
+                <a16:creationId xmlns:a16="http://schemas.microsoft.com/office/drawing/2014/main" id="{D83E9CED-5A39-49BF-9563-8FD5937C2082}"/>
               </a:ext>
             </a:extLst>
           </p:cNvPr>
@@ -6352,27 +6369,159 @@
             <a:spLocks noGrp="1"/>
           </p:cNvSpPr>
           <p:nvPr>
-            <p:ph type="title"/>
-          </p:nvPr>
-        </p:nvSpPr>
-        <p:spPr/>
-        <p:txBody>
-          <a:bodyPr/>
-          <a:lstStyle/>
-          <a:p>
-            <a:r>
-              <a:rPr lang="en-US" dirty="0"/>
-              <a:t>Outline</a:t>
-            </a:r>
-          </a:p>
-        </p:txBody>
-      </p:sp>
-      <p:sp>
-        <p:nvSpPr>
-          <p:cNvPr id="3" name="Content Placeholder 2">
+            <p:ph idx="1"/>
+          </p:nvPr>
+        </p:nvSpPr>
+        <p:spPr>
+          <a:xfrm>
+            <a:off x="592114" y="1242391"/>
+            <a:ext cx="8603644" cy="4591877"/>
+          </a:xfrm>
+        </p:spPr>
+        <p:txBody>
+          <a:bodyPr>
+            <a:normAutofit/>
+          </a:bodyPr>
+          <a:lstStyle/>
+          <a:p>
+            <a:r>
+              <a:rPr lang="en-US" dirty="0">
+                <a:solidFill>
+                  <a:schemeClr val="accent2">
+                    <a:lumMod val="60000"/>
+                    <a:lumOff val="40000"/>
+                  </a:schemeClr>
+                </a:solidFill>
+              </a:rPr>
+              <a:t>Synchronicity</a:t>
+            </a:r>
+            <a:r>
+              <a:rPr lang="en-US" dirty="0"/>
+              <a:t> can achieved by employing </a:t>
+            </a:r>
+            <a:r>
+              <a:rPr lang="en-US" dirty="0">
+                <a:solidFill>
+                  <a:schemeClr val="tx1"/>
+                </a:solidFill>
+              </a:rPr>
+              <a:t>locks</a:t>
+            </a:r>
+          </a:p>
+          <a:p>
+            <a:r>
+              <a:rPr lang="en-US" dirty="0"/>
+              <a:t>When locks are used properly, they fix race conditions</a:t>
+            </a:r>
+          </a:p>
+          <a:p>
+            <a:pPr lvl="1"/>
+            <a:r>
+              <a:rPr lang="en-US" dirty="0"/>
+              <a:t>(Does this count for all abstract “systems”? Does it fix all types of race conditions? The abstract “lock” is engineered to solve race conditions for an abstract “system” right?)</a:t>
+            </a:r>
+          </a:p>
+          <a:p>
+            <a:r>
+              <a:rPr lang="en-US" dirty="0">
+                <a:solidFill>
+                  <a:schemeClr val="accent2">
+                    <a:lumMod val="60000"/>
+                    <a:lumOff val="40000"/>
+                  </a:schemeClr>
+                </a:solidFill>
+              </a:rPr>
+              <a:t>Locks</a:t>
+            </a:r>
+            <a:r>
+              <a:rPr lang="en-US" dirty="0"/>
+              <a:t> are effectively </a:t>
+            </a:r>
+            <a:r>
+              <a:rPr lang="en-US" dirty="0" err="1"/>
+              <a:t>booleans</a:t>
+            </a:r>
+            <a:r>
+              <a:rPr lang="en-US" dirty="0"/>
+              <a:t> that are set when using objects or data shared between threads</a:t>
+            </a:r>
+          </a:p>
+          <a:p>
+            <a:r>
+              <a:rPr lang="en-US" dirty="0"/>
+              <a:t>When a thread sets a lock to </a:t>
+            </a:r>
+            <a:r>
+              <a:rPr lang="en-US" i="1" dirty="0"/>
+              <a:t>locked</a:t>
+            </a:r>
+            <a:r>
+              <a:rPr lang="en-US" dirty="0"/>
+              <a:t>, that thread </a:t>
+            </a:r>
+            <a:r>
+              <a:rPr lang="en-US" dirty="0">
+                <a:solidFill>
+                  <a:schemeClr val="accent2">
+                    <a:lumMod val="60000"/>
+                    <a:lumOff val="40000"/>
+                  </a:schemeClr>
+                </a:solidFill>
+              </a:rPr>
+              <a:t>“acquires”</a:t>
+            </a:r>
+            <a:r>
+              <a:rPr lang="en-US" dirty="0"/>
+              <a:t> the lock</a:t>
+            </a:r>
+          </a:p>
+          <a:p>
+            <a:r>
+              <a:rPr lang="en-US" dirty="0"/>
+              <a:t>When a thread unlocks a lock, that thread </a:t>
+            </a:r>
+            <a:r>
+              <a:rPr lang="en-US" dirty="0">
+                <a:solidFill>
+                  <a:schemeClr val="accent2">
+                    <a:lumMod val="60000"/>
+                    <a:lumOff val="40000"/>
+                  </a:schemeClr>
+                </a:solidFill>
+              </a:rPr>
+              <a:t>“releases”</a:t>
+            </a:r>
+            <a:r>
+              <a:rPr lang="en-US" dirty="0"/>
+              <a:t> the lock</a:t>
+            </a:r>
+          </a:p>
+          <a:p>
+            <a:endParaRPr lang="en-US" dirty="0"/>
+          </a:p>
+          <a:p>
+            <a:endParaRPr lang="en-US" dirty="0"/>
+          </a:p>
+          <a:p>
+            <a:endParaRPr lang="en-US" dirty="0"/>
+          </a:p>
+          <a:p>
+            <a:endParaRPr lang="en-US" dirty="0"/>
+          </a:p>
+          <a:p>
+            <a:endParaRPr lang="en-US" dirty="0"/>
+          </a:p>
+          <a:p>
+            <a:endParaRPr lang="en-US" dirty="0"/>
+          </a:p>
+        </p:txBody>
+      </p:sp>
+      <p:sp>
+        <p:nvSpPr>
+          <p:cNvPr id="15" name="Title 14">
             <a:extLst>
               <a:ext uri="{FF2B5EF4-FFF2-40B4-BE49-F238E27FC236}">
-                <a16:creationId xmlns:a16="http://schemas.microsoft.com/office/drawing/2014/main" id="{5D73516D-08C5-41D9-94BA-396221B63085}"/>
+                <a16:creationId xmlns:a16="http://schemas.microsoft.com/office/drawing/2014/main" id="{DD5971B8-AEDF-4A4F-A785-3ABA81D954C9}"/>
               </a:ext>
             </a:extLst>
           </p:cNvPr>
@@ -6380,66 +6529,24 @@
             <a:spLocks noGrp="1"/>
           </p:cNvSpPr>
           <p:nvPr>
-            <p:ph idx="1"/>
-          </p:nvPr>
-        </p:nvSpPr>
-        <p:spPr/>
-        <p:txBody>
-          <a:bodyPr/>
-          <a:lstStyle/>
-          <a:p>
-            <a:r>
-              <a:rPr lang="en-US" dirty="0">
-                <a:solidFill>
-                  <a:schemeClr val="accent1">
-                    <a:lumMod val="75000"/>
-                  </a:schemeClr>
-                </a:solidFill>
-              </a:rPr>
-              <a:t>Establish needed concepts</a:t>
-            </a:r>
-          </a:p>
-          <a:p>
-            <a:r>
-              <a:rPr lang="en-US" dirty="0">
-                <a:solidFill>
-                  <a:schemeClr val="accent1">
-                    <a:lumMod val="75000"/>
-                  </a:schemeClr>
-                </a:solidFill>
-              </a:rPr>
-              <a:t>Thread scheduling and thread load-balancing on Linux</a:t>
-            </a:r>
-          </a:p>
-          <a:p>
-            <a:r>
-              <a:rPr lang="en-US" dirty="0">
-                <a:solidFill>
-                  <a:schemeClr val="tx1"/>
-                </a:solidFill>
-              </a:rPr>
-              <a:t>Bug fixes and new developments to the Linux thread scheduler</a:t>
-            </a:r>
-          </a:p>
-          <a:p>
-            <a:pPr lvl="1"/>
-            <a:r>
-              <a:rPr lang="en-US" dirty="0"/>
-              <a:t>Four bugs found within current implementation of CFS</a:t>
-            </a:r>
-          </a:p>
-          <a:p>
-            <a:pPr lvl="1"/>
-            <a:r>
-              <a:rPr lang="en-US" dirty="0"/>
-              <a:t>FLSCHED: The lockless thread scheduler</a:t>
-            </a:r>
-          </a:p>
-          <a:p>
-            <a:pPr lvl="1"/>
-            <a:r>
-              <a:rPr lang="en-US" dirty="0"/>
-              <a:t>Shuffler: Cache locality improvements via thread migration</a:t>
+            <p:ph type="title"/>
+          </p:nvPr>
+        </p:nvSpPr>
+        <p:spPr>
+          <a:xfrm>
+            <a:off x="677333" y="609600"/>
+            <a:ext cx="4878077" cy="632791"/>
+          </a:xfrm>
+        </p:spPr>
+        <p:txBody>
+          <a:bodyPr>
+            <a:normAutofit fontScale="90000"/>
+          </a:bodyPr>
+          <a:lstStyle/>
+          <a:p>
+            <a:r>
+              <a:rPr lang="en-US" dirty="0"/>
+              <a:t>Synchronicity and Locks</a:t>
             </a:r>
           </a:p>
         </p:txBody>
@@ -6447,7 +6554,7 @@
     </p:spTree>
     <p:extLst>
       <p:ext uri="{BB962C8B-B14F-4D97-AF65-F5344CB8AC3E}">
-        <p14:creationId xmlns:p14="http://schemas.microsoft.com/office/powerpoint/2010/main" val="2043729067"/>
+        <p14:creationId xmlns:p14="http://schemas.microsoft.com/office/powerpoint/2010/main" val="2481929479"/>
       </p:ext>
     </p:extLst>
   </p:cSld>
@@ -6479,7 +6586,7 @@
           <p:cNvPr id="2" name="Title 1">
             <a:extLst>
               <a:ext uri="{FF2B5EF4-FFF2-40B4-BE49-F238E27FC236}">
-                <a16:creationId xmlns:a16="http://schemas.microsoft.com/office/drawing/2014/main" id="{0010AE82-4563-4896-9624-FF29FC57A3EB}"/>
+                <a16:creationId xmlns:a16="http://schemas.microsoft.com/office/drawing/2014/main" id="{F1A1A222-0E29-4B18-A826-07D230EC8EC5}"/>
               </a:ext>
             </a:extLst>
           </p:cNvPr>
@@ -6490,44 +6597,63 @@
             <p:ph type="title"/>
           </p:nvPr>
         </p:nvSpPr>
-        <p:spPr/>
+        <p:spPr>
+          <a:xfrm>
+            <a:off x="591069" y="454325"/>
+            <a:ext cx="8596668" cy="1320800"/>
+          </a:xfrm>
+        </p:spPr>
         <p:txBody>
           <a:bodyPr/>
           <a:lstStyle/>
           <a:p>
-            <a:endParaRPr lang="en-US"/>
-          </a:p>
-        </p:txBody>
-      </p:sp>
-      <p:sp>
-        <p:nvSpPr>
-          <p:cNvPr id="3" name="Content Placeholder 2">
+            <a:r>
+              <a:rPr lang="en-US" dirty="0"/>
+              <a:t>Lock Example</a:t>
+            </a:r>
+          </a:p>
+        </p:txBody>
+      </p:sp>
+      <p:pic>
+        <p:nvPicPr>
+          <p:cNvPr id="11" name="Graphic 10">
             <a:extLst>
               <a:ext uri="{FF2B5EF4-FFF2-40B4-BE49-F238E27FC236}">
-                <a16:creationId xmlns:a16="http://schemas.microsoft.com/office/drawing/2014/main" id="{57A4FE7C-4BD5-4E49-8853-430E429FBFD3}"/>
+                <a16:creationId xmlns:a16="http://schemas.microsoft.com/office/drawing/2014/main" id="{A1DA255A-6461-4F10-A960-36AECC00CFFB}"/>
               </a:ext>
             </a:extLst>
           </p:cNvPr>
-          <p:cNvSpPr>
-            <a:spLocks noGrp="1"/>
-          </p:cNvSpPr>
-          <p:nvPr>
-            <p:ph idx="1"/>
-          </p:nvPr>
-        </p:nvSpPr>
-        <p:spPr/>
-        <p:txBody>
-          <a:bodyPr/>
-          <a:lstStyle/>
-          <a:p>
-            <a:endParaRPr lang="en-US"/>
-          </a:p>
-        </p:txBody>
-      </p:sp>
+          <p:cNvPicPr>
+            <a:picLocks noChangeAspect="1"/>
+          </p:cNvPicPr>
+          <p:nvPr/>
+        </p:nvPicPr>
+        <p:blipFill>
+          <a:blip r:embed="rId2">
+            <a:extLst>
+              <a:ext uri="{96DAC541-7B7A-43D3-8B79-37D633B846F1}">
+                <asvg:svgBlip xmlns:asvg="http://schemas.microsoft.com/office/drawing/2016/SVG/main" r:embed="rId3"/>
+              </a:ext>
+            </a:extLst>
+          </a:blip>
+          <a:stretch>
+            <a:fillRect/>
+          </a:stretch>
+        </p:blipFill>
+        <p:spPr>
+          <a:xfrm>
+            <a:off x="1777819" y="1114725"/>
+            <a:ext cx="6223168" cy="5633788"/>
+          </a:xfrm>
+          <a:prstGeom prst="rect">
+            <a:avLst/>
+          </a:prstGeom>
+        </p:spPr>
+      </p:pic>
     </p:spTree>
     <p:extLst>
       <p:ext uri="{BB962C8B-B14F-4D97-AF65-F5344CB8AC3E}">
-        <p14:creationId xmlns:p14="http://schemas.microsoft.com/office/powerpoint/2010/main" val="3729969146"/>
+        <p14:creationId xmlns:p14="http://schemas.microsoft.com/office/powerpoint/2010/main" val="475621101"/>
       </p:ext>
     </p:extLst>
   </p:cSld>
@@ -6559,7 +6685,7 @@
           <p:cNvPr id="2" name="Title 1">
             <a:extLst>
               <a:ext uri="{FF2B5EF4-FFF2-40B4-BE49-F238E27FC236}">
-                <a16:creationId xmlns:a16="http://schemas.microsoft.com/office/drawing/2014/main" id="{F95B23F0-1EE8-4BD1-B189-337575BC67EE}"/>
+                <a16:creationId xmlns:a16="http://schemas.microsoft.com/office/drawing/2014/main" id="{BDD0509A-6666-45C3-8F03-D2600104FFEE}"/>
               </a:ext>
             </a:extLst>
           </p:cNvPr>
@@ -6577,7 +6703,7 @@
           <a:p>
             <a:r>
               <a:rPr lang="en-US" dirty="0"/>
-              <a:t>Conclusions</a:t>
+              <a:t>Outline</a:t>
             </a:r>
           </a:p>
         </p:txBody>
@@ -6587,7 +6713,7 @@
           <p:cNvPr id="3" name="Content Placeholder 2">
             <a:extLst>
               <a:ext uri="{FF2B5EF4-FFF2-40B4-BE49-F238E27FC236}">
-                <a16:creationId xmlns:a16="http://schemas.microsoft.com/office/drawing/2014/main" id="{BC507F40-A0C7-41CB-9B1E-2E110A1FA36B}"/>
+                <a16:creationId xmlns:a16="http://schemas.microsoft.com/office/drawing/2014/main" id="{5D73516D-08C5-41D9-94BA-396221B63085}"/>
               </a:ext>
             </a:extLst>
           </p:cNvPr>
@@ -6603,14 +6729,86 @@
           <a:bodyPr/>
           <a:lstStyle/>
           <a:p>
-            <a:endParaRPr lang="en-US"/>
+            <a:r>
+              <a:rPr lang="en-US" dirty="0">
+                <a:solidFill>
+                  <a:schemeClr val="accent1">
+                    <a:lumMod val="75000"/>
+                  </a:schemeClr>
+                </a:solidFill>
+              </a:rPr>
+              <a:t>Establish needed concepts</a:t>
+            </a:r>
+          </a:p>
+          <a:p>
+            <a:r>
+              <a:rPr lang="en-US" dirty="0">
+                <a:solidFill>
+                  <a:schemeClr val="tx1"/>
+                </a:solidFill>
+              </a:rPr>
+              <a:t>Thread scheduling and load-balancing on Linux</a:t>
+            </a:r>
+          </a:p>
+          <a:p>
+            <a:pPr lvl="1"/>
+            <a:r>
+              <a:rPr lang="en-US" dirty="0">
+                <a:solidFill>
+                  <a:schemeClr val="tx1"/>
+                </a:solidFill>
+              </a:rPr>
+              <a:t>Completely Fair Scheduler (CFS)</a:t>
+            </a:r>
+          </a:p>
+          <a:p>
+            <a:pPr lvl="1"/>
+            <a:r>
+              <a:rPr lang="en-US" dirty="0">
+                <a:solidFill>
+                  <a:schemeClr val="tx1"/>
+                </a:solidFill>
+              </a:rPr>
+              <a:t>Cache and Scheduling Domains</a:t>
+            </a:r>
+          </a:p>
+          <a:p>
+            <a:pPr lvl="1"/>
+            <a:r>
+              <a:rPr lang="en-US" dirty="0">
+                <a:solidFill>
+                  <a:schemeClr val="tx1"/>
+                </a:solidFill>
+              </a:rPr>
+              <a:t>Load Balance algorithm for the CFS</a:t>
+            </a:r>
+          </a:p>
+          <a:p>
+            <a:r>
+              <a:rPr lang="en-US" dirty="0">
+                <a:solidFill>
+                  <a:schemeClr val="accent1">
+                    <a:lumMod val="75000"/>
+                  </a:schemeClr>
+                </a:solidFill>
+              </a:rPr>
+              <a:t>Bug fixes and two new developments to the Linux thread scheduler</a:t>
+            </a:r>
+          </a:p>
+          <a:p>
+            <a:pPr lvl="1"/>
+            <a:endParaRPr lang="en-US" dirty="0"/>
+          </a:p>
+          <a:p>
+            <a:pPr lvl="2"/>
+            <a:endParaRPr lang="en-US" dirty="0"/>
           </a:p>
         </p:txBody>
       </p:sp>
     </p:spTree>
     <p:extLst>
       <p:ext uri="{BB962C8B-B14F-4D97-AF65-F5344CB8AC3E}">
-        <p14:creationId xmlns:p14="http://schemas.microsoft.com/office/powerpoint/2010/main" val="991287881"/>
+        <p14:creationId xmlns:p14="http://schemas.microsoft.com/office/powerpoint/2010/main" val="3175680182"/>
       </p:ext>
     </p:extLst>
   </p:cSld>
@@ -6642,7 +6840,7 @@
           <p:cNvPr id="2" name="Title 1">
             <a:extLst>
               <a:ext uri="{FF2B5EF4-FFF2-40B4-BE49-F238E27FC236}">
-                <a16:creationId xmlns:a16="http://schemas.microsoft.com/office/drawing/2014/main" id="{66071387-2664-4BBA-A1B9-717F5F04EC6B}"/>
+                <a16:creationId xmlns:a16="http://schemas.microsoft.com/office/drawing/2014/main" id="{EEB5F2EC-4AE3-4FB5-B1B5-9D6102455DBF}"/>
               </a:ext>
             </a:extLst>
           </p:cNvPr>
@@ -6653,19 +6851,14 @@
             <p:ph type="title"/>
           </p:nvPr>
         </p:nvSpPr>
-        <p:spPr>
-          <a:xfrm>
-            <a:off x="677334" y="362465"/>
-            <a:ext cx="8596668" cy="1320800"/>
-          </a:xfrm>
-        </p:spPr>
+        <p:spPr/>
         <p:txBody>
           <a:bodyPr/>
           <a:lstStyle/>
           <a:p>
             <a:r>
               <a:rPr lang="en-US" dirty="0"/>
-              <a:t>References</a:t>
+              <a:t>Completely Fair Scheduler (CFS)</a:t>
             </a:r>
           </a:p>
         </p:txBody>
@@ -6675,7 +6868,7 @@
           <p:cNvPr id="3" name="Content Placeholder 2">
             <a:extLst>
               <a:ext uri="{FF2B5EF4-FFF2-40B4-BE49-F238E27FC236}">
-                <a16:creationId xmlns:a16="http://schemas.microsoft.com/office/drawing/2014/main" id="{1C7F16B6-7206-424A-BAFA-39935C7949CC}"/>
+                <a16:creationId xmlns:a16="http://schemas.microsoft.com/office/drawing/2014/main" id="{0C32515D-2D7F-4F44-8E64-A7E3EB354FA4}"/>
               </a:ext>
             </a:extLst>
           </p:cNvPr>
@@ -6688,287 +6881,93 @@
         </p:nvSpPr>
         <p:spPr>
           <a:xfrm>
-            <a:off x="677334" y="1466335"/>
-            <a:ext cx="8596668" cy="5067816"/>
+            <a:off x="677334" y="2160589"/>
+            <a:ext cx="8596668" cy="4165396"/>
           </a:xfrm>
         </p:spPr>
         <p:txBody>
           <a:bodyPr/>
           <a:lstStyle/>
           <a:p>
-            <a:pPr>
-              <a:buFont typeface="+mj-lt"/>
-              <a:buAutoNum type="arabicPeriod"/>
+            <a:r>
+              <a:rPr lang="en-US" dirty="0"/>
+              <a:t>Default Linux Thread Scheduler (there are others)</a:t>
+            </a:r>
+          </a:p>
+          <a:p>
+            <a:r>
+              <a:rPr lang="en-US" dirty="0"/>
+              <a:t>Handles which threads are executed at what times and on which CPU cores</a:t>
+            </a:r>
+          </a:p>
+          <a:p>
+            <a:r>
+              <a:rPr lang="en-US" dirty="0"/>
+              <a:t>Spend a </a:t>
+            </a:r>
+            <a:r>
+              <a:rPr lang="en-US" i="1" dirty="0"/>
+              <a:t>fair</a:t>
+            </a:r>
+            <a:r>
+              <a:rPr lang="en-US" dirty="0"/>
+              <a:t> amount of runtime on all threads</a:t>
+            </a:r>
+          </a:p>
+          <a:p>
+            <a:pPr marL="0" indent="0">
+              <a:buNone/>
             </a:pPr>
+            <a:endParaRPr lang="en-US" dirty="0"/>
+          </a:p>
+          <a:p>
+            <a:r>
+              <a:rPr lang="en-US" dirty="0"/>
+              <a:t>The CFS implementation is simple for a single-core system</a:t>
+            </a:r>
+          </a:p>
+          <a:p>
+            <a:r>
+              <a:rPr lang="en-US" dirty="0"/>
+              <a:t>For now, let’s assume one single core CPU</a:t>
+            </a:r>
+          </a:p>
+          <a:p>
+            <a:endParaRPr lang="en-US" dirty="0"/>
+          </a:p>
+          <a:p>
+            <a:r>
+              <a:rPr lang="en-US" dirty="0"/>
+              <a:t>The scheduler switches active threads by saving and restoring thread and processor state information.</a:t>
+            </a:r>
+          </a:p>
+          <a:p>
+            <a:r>
+              <a:rPr lang="en-US" dirty="0"/>
+              <a:t>Switching active threads and processes are called </a:t>
+            </a:r>
             <a:r>
               <a:rPr lang="en-US" dirty="0">
                 <a:solidFill>
-                  <a:schemeClr val="accent1">
-                    <a:lumMod val="40000"/>
-                    <a:lumOff val="60000"/>
-                  </a:schemeClr>
-                </a:solidFill>
-              </a:rPr>
-              <a:t>K. Kumar, P. Rajiv, G. Laxmi, and N. </a:t>
-            </a:r>
-            <a:r>
-              <a:rPr lang="en-US" dirty="0" err="1">
-                <a:solidFill>
-                  <a:schemeClr val="accent1">
-                    <a:lumMod val="40000"/>
-                    <a:lumOff val="60000"/>
-                  </a:schemeClr>
-                </a:solidFill>
-              </a:rPr>
-              <a:t>Bhuyan</a:t>
-            </a:r>
-            <a:r>
-              <a:rPr lang="en-US" dirty="0">
-                <a:solidFill>
-                  <a:schemeClr val="accent1">
-                    <a:lumMod val="40000"/>
-                    <a:lumOff val="60000"/>
-                  </a:schemeClr>
-                </a:solidFill>
-              </a:rPr>
-              <a:t>.</a:t>
-            </a:r>
-            <a:br>
-              <a:rPr lang="en-US" dirty="0">
-                <a:solidFill>
-                  <a:schemeClr val="accent1">
-                    <a:lumMod val="40000"/>
-                    <a:lumOff val="60000"/>
-                  </a:schemeClr>
-                </a:solidFill>
-              </a:rPr>
-            </a:br>
-            <a:r>
-              <a:rPr lang="en-US" dirty="0"/>
-              <a:t>Shuffling: A framework for lock contention aware thread scheduling for multicore multiprocessor systems.</a:t>
-            </a:r>
-            <a:br>
-              <a:rPr lang="en-US" dirty="0"/>
-            </a:br>
-            <a:r>
-              <a:rPr lang="en-US" dirty="0">
-                <a:solidFill>
-                  <a:schemeClr val="accent1">
+                  <a:schemeClr val="accent2">
                     <a:lumMod val="60000"/>
                     <a:lumOff val="40000"/>
                   </a:schemeClr>
                 </a:solidFill>
               </a:rPr>
-              <a:t>In 2014 23rd International Conference on Parallel Architecture and Compilation Techniques (PACT), pages 289–300, Aug 2014.</a:t>
-            </a:r>
-          </a:p>
-          <a:p>
-            <a:pPr>
-              <a:buFont typeface="+mj-lt"/>
-              <a:buAutoNum type="arabicPeriod"/>
-            </a:pPr>
-            <a:r>
-              <a:rPr lang="en-US" dirty="0">
-                <a:solidFill>
-                  <a:schemeClr val="accent1">
-                    <a:lumMod val="40000"/>
-                    <a:lumOff val="60000"/>
-                  </a:schemeClr>
-                </a:solidFill>
-              </a:rPr>
-              <a:t>J.-P. </a:t>
-            </a:r>
-            <a:r>
-              <a:rPr lang="en-US" dirty="0" err="1">
-                <a:solidFill>
-                  <a:schemeClr val="accent1">
-                    <a:lumMod val="40000"/>
-                    <a:lumOff val="60000"/>
-                  </a:schemeClr>
-                </a:solidFill>
-              </a:rPr>
-              <a:t>Lozi</a:t>
-            </a:r>
-            <a:r>
-              <a:rPr lang="en-US" dirty="0">
-                <a:solidFill>
-                  <a:schemeClr val="accent1">
-                    <a:lumMod val="40000"/>
-                    <a:lumOff val="60000"/>
-                  </a:schemeClr>
-                </a:solidFill>
-              </a:rPr>
-              <a:t>, B. Lepers, J. Funston, F. Gaud, V. </a:t>
-            </a:r>
-            <a:r>
-              <a:rPr lang="en-US" dirty="0" err="1">
-                <a:solidFill>
-                  <a:schemeClr val="accent1">
-                    <a:lumMod val="40000"/>
-                    <a:lumOff val="60000"/>
-                  </a:schemeClr>
-                </a:solidFill>
-              </a:rPr>
-              <a:t>Quéma</a:t>
-            </a:r>
-            <a:r>
-              <a:rPr lang="en-US" dirty="0">
-                <a:solidFill>
-                  <a:schemeClr val="accent1">
-                    <a:lumMod val="40000"/>
-                    <a:lumOff val="60000"/>
-                  </a:schemeClr>
-                </a:solidFill>
-              </a:rPr>
-              <a:t>, and A. </a:t>
-            </a:r>
-            <a:r>
-              <a:rPr lang="en-US" dirty="0" err="1">
-                <a:solidFill>
-                  <a:schemeClr val="accent1">
-                    <a:lumMod val="40000"/>
-                    <a:lumOff val="60000"/>
-                  </a:schemeClr>
-                </a:solidFill>
-              </a:rPr>
-              <a:t>Fedorova</a:t>
-            </a:r>
-            <a:r>
-              <a:rPr lang="en-US" dirty="0">
-                <a:solidFill>
-                  <a:schemeClr val="accent1">
-                    <a:lumMod val="40000"/>
-                    <a:lumOff val="60000"/>
-                  </a:schemeClr>
-                </a:solidFill>
-              </a:rPr>
+              <a:t>context switches</a:t>
+            </a:r>
+            <a:r>
+              <a:rPr lang="en-US" dirty="0"/>
               <a:t>.</a:t>
             </a:r>
-            <a:br>
-              <a:rPr lang="en-US" dirty="0"/>
-            </a:br>
-            <a:r>
-              <a:rPr lang="en-US" dirty="0"/>
-              <a:t>The </a:t>
-            </a:r>
-            <a:r>
-              <a:rPr lang="en-US" dirty="0" err="1"/>
-              <a:t>linux</a:t>
-            </a:r>
-            <a:r>
-              <a:rPr lang="en-US" dirty="0"/>
-              <a:t> scheduler: A decade of wasted cores.</a:t>
-            </a:r>
-            <a:br>
-              <a:rPr lang="en-US" dirty="0"/>
-            </a:br>
-            <a:r>
-              <a:rPr lang="en-US" dirty="0">
-                <a:solidFill>
-                  <a:schemeClr val="accent1">
-                    <a:lumMod val="60000"/>
-                    <a:lumOff val="40000"/>
-                  </a:schemeClr>
-                </a:solidFill>
-              </a:rPr>
-              <a:t>In Proceedings of the Eleventh European Conference on Computer Systems, </a:t>
-            </a:r>
-            <a:r>
-              <a:rPr lang="en-US" dirty="0" err="1">
-                <a:solidFill>
-                  <a:schemeClr val="accent1">
-                    <a:lumMod val="60000"/>
-                    <a:lumOff val="40000"/>
-                  </a:schemeClr>
-                </a:solidFill>
-              </a:rPr>
-              <a:t>EuroSys</a:t>
-            </a:r>
-            <a:r>
-              <a:rPr lang="en-US" dirty="0">
-                <a:solidFill>
-                  <a:schemeClr val="accent1">
-                    <a:lumMod val="60000"/>
-                    <a:lumOff val="40000"/>
-                  </a:schemeClr>
-                </a:solidFill>
-              </a:rPr>
-              <a:t> ’16, pages 1:1–1:16, New York, NY, USA, 2016. ACM.</a:t>
-            </a:r>
-          </a:p>
-          <a:p>
-            <a:pPr>
-              <a:buFont typeface="+mj-lt"/>
-              <a:buAutoNum type="arabicPeriod"/>
-            </a:pPr>
-            <a:r>
-              <a:rPr lang="en-US" dirty="0">
-                <a:solidFill>
-                  <a:schemeClr val="accent1">
-                    <a:lumMod val="40000"/>
-                    <a:lumOff val="60000"/>
-                  </a:schemeClr>
-                </a:solidFill>
-              </a:rPr>
-              <a:t>U. B. Nisar, M. Aleem, M. A. Iqbal, and N. S. Vo.</a:t>
-            </a:r>
-            <a:br>
-              <a:rPr lang="en-US" dirty="0"/>
-            </a:br>
-            <a:r>
-              <a:rPr lang="en-US" dirty="0"/>
-              <a:t>Jumbler: A lock-contention aware thread scheduler for multi-core parallel machines.</a:t>
-            </a:r>
-            <a:br>
-              <a:rPr lang="en-US" dirty="0"/>
-            </a:br>
-            <a:r>
-              <a:rPr lang="en-US" dirty="0">
-                <a:solidFill>
-                  <a:schemeClr val="accent1">
-                    <a:lumMod val="60000"/>
-                    <a:lumOff val="40000"/>
-                  </a:schemeClr>
-                </a:solidFill>
-              </a:rPr>
-              <a:t>In 2017 International Conference on Recent Advances in Signal Processing, Telecommunications Computing (</a:t>
-            </a:r>
-            <a:r>
-              <a:rPr lang="en-US" dirty="0" err="1">
-                <a:solidFill>
-                  <a:schemeClr val="accent1">
-                    <a:lumMod val="60000"/>
-                    <a:lumOff val="40000"/>
-                  </a:schemeClr>
-                </a:solidFill>
-              </a:rPr>
-              <a:t>SigTelCom</a:t>
-            </a:r>
-            <a:r>
-              <a:rPr lang="en-US" dirty="0">
-                <a:solidFill>
-                  <a:schemeClr val="accent1">
-                    <a:lumMod val="60000"/>
-                    <a:lumOff val="40000"/>
-                  </a:schemeClr>
-                </a:solidFill>
-              </a:rPr>
-              <a:t>), pages 77–81, Jan 2017.</a:t>
-            </a:r>
-          </a:p>
-          <a:p>
-            <a:pPr>
-              <a:buFont typeface="+mj-lt"/>
-              <a:buAutoNum type="arabicPeriod"/>
-            </a:pPr>
-            <a:endParaRPr lang="en-US" dirty="0"/>
           </a:p>
         </p:txBody>
       </p:sp>
     </p:spTree>
     <p:extLst>
       <p:ext uri="{BB962C8B-B14F-4D97-AF65-F5344CB8AC3E}">
-        <p14:creationId xmlns:p14="http://schemas.microsoft.com/office/powerpoint/2010/main" val="1409436407"/>
+        <p14:creationId xmlns:p14="http://schemas.microsoft.com/office/powerpoint/2010/main" val="3479385123"/>
       </p:ext>
     </p:extLst>
   </p:cSld>
@@ -6978,7 +6977,7 @@
 </p:sld>
 </file>
 
-<file path=ppt/slides/slide2.xml><?xml version="1.0" encoding="utf-8"?>
+<file path=ppt/slides/slide15.xml><?xml version="1.0" encoding="utf-8"?>
 <p:sld xmlns:a="http://schemas.openxmlformats.org/drawingml/2006/main" xmlns:r="http://schemas.openxmlformats.org/officeDocument/2006/relationships" xmlns:p="http://schemas.openxmlformats.org/presentationml/2006/main">
   <p:cSld>
     <p:spTree>
@@ -6997,52 +6996,181 @@
       </p:grpSpPr>
       <p:sp>
         <p:nvSpPr>
-          <p:cNvPr id="4" name="TextBox 3">
+          <p:cNvPr id="3" name="Content Placeholder 2">
             <a:extLst>
               <a:ext uri="{FF2B5EF4-FFF2-40B4-BE49-F238E27FC236}">
-                <a16:creationId xmlns:a16="http://schemas.microsoft.com/office/drawing/2014/main" id="{B13FF52D-29EB-4115-9A3B-7840FC0DFFB1}"/>
+                <a16:creationId xmlns:a16="http://schemas.microsoft.com/office/drawing/2014/main" id="{D83E9CED-5A39-49BF-9563-8FD5937C2082}"/>
               </a:ext>
             </a:extLst>
           </p:cNvPr>
-          <p:cNvSpPr txBox="1"/>
-          <p:nvPr/>
+          <p:cNvSpPr>
+            <a:spLocks noGrp="1"/>
+          </p:cNvSpPr>
+          <p:nvPr>
+            <p:ph idx="1"/>
+          </p:nvPr>
         </p:nvSpPr>
         <p:spPr>
           <a:xfrm>
-            <a:off x="494271" y="2207742"/>
-            <a:ext cx="8647926" cy="2246769"/>
+            <a:off x="592114" y="1242391"/>
+            <a:ext cx="8603644" cy="4591877"/>
           </a:xfrm>
-          <a:prstGeom prst="rect">
-            <a:avLst/>
-          </a:prstGeom>
-          <a:noFill/>
         </p:spPr>
         <p:txBody>
-          <a:bodyPr wrap="square" rtlCol="0">
-            <a:spAutoFit/>
+          <a:bodyPr>
+            <a:normAutofit/>
           </a:bodyPr>
           <a:lstStyle/>
           <a:p>
             <a:r>
-              <a:rPr lang="en-US" sz="2800" dirty="0"/>
-              <a:t>“And you have to realize that there are not very many things that have aged as well as the scheduler. Which is just another proof that scheduling is easy.”</a:t>
-            </a:r>
-          </a:p>
-          <a:p>
-            <a:r>
-              <a:rPr lang="en-US" sz="2800" dirty="0"/>
-              <a:t>Linus Torvalds, 2001 [2]</a:t>
-            </a:r>
-          </a:p>
-          <a:p>
-            <a:endParaRPr lang="en-US" sz="2800" dirty="0"/>
+              <a:rPr lang="en-US" dirty="0">
+                <a:solidFill>
+                  <a:schemeClr val="accent2">
+                    <a:lumMod val="60000"/>
+                    <a:lumOff val="40000"/>
+                  </a:schemeClr>
+                </a:solidFill>
+              </a:rPr>
+              <a:t>Process</a:t>
+            </a:r>
+          </a:p>
+          <a:p>
+            <a:pPr lvl="1"/>
+            <a:r>
+              <a:rPr lang="en-US" dirty="0">
+                <a:solidFill>
+                  <a:schemeClr val="accent2">
+                    <a:lumMod val="60000"/>
+                    <a:lumOff val="40000"/>
+                  </a:schemeClr>
+                </a:solidFill>
+              </a:rPr>
+              <a:t>[state info]</a:t>
+            </a:r>
+          </a:p>
+          <a:p>
+            <a:r>
+              <a:rPr lang="en-US" dirty="0">
+                <a:solidFill>
+                  <a:schemeClr val="accent2">
+                    <a:lumMod val="60000"/>
+                    <a:lumOff val="40000"/>
+                  </a:schemeClr>
+                </a:solidFill>
+              </a:rPr>
+              <a:t>Thread</a:t>
+            </a:r>
+          </a:p>
+          <a:p>
+            <a:pPr lvl="1"/>
+            <a:r>
+              <a:rPr lang="en-US" dirty="0">
+                <a:solidFill>
+                  <a:schemeClr val="accent2">
+                    <a:lumMod val="60000"/>
+                    <a:lumOff val="40000"/>
+                  </a:schemeClr>
+                </a:solidFill>
+              </a:rPr>
+              <a:t>[state info]</a:t>
+            </a:r>
+          </a:p>
+          <a:p>
+            <a:endParaRPr lang="en-US" dirty="0">
+              <a:solidFill>
+                <a:schemeClr val="accent2">
+                  <a:lumMod val="60000"/>
+                  <a:lumOff val="40000"/>
+                </a:schemeClr>
+              </a:solidFill>
+            </a:endParaRPr>
+          </a:p>
+          <a:p>
+            <a:endParaRPr lang="en-US" dirty="0">
+              <a:solidFill>
+                <a:schemeClr val="accent2">
+                  <a:lumMod val="60000"/>
+                  <a:lumOff val="40000"/>
+                </a:schemeClr>
+              </a:solidFill>
+            </a:endParaRPr>
+          </a:p>
+          <a:p>
+            <a:endParaRPr lang="en-US" dirty="0">
+              <a:solidFill>
+                <a:schemeClr val="accent2">
+                  <a:lumMod val="60000"/>
+                  <a:lumOff val="40000"/>
+                </a:schemeClr>
+              </a:solidFill>
+            </a:endParaRPr>
+          </a:p>
+          <a:p>
+            <a:endParaRPr lang="en-US" dirty="0">
+              <a:solidFill>
+                <a:schemeClr val="accent2">
+                  <a:lumMod val="60000"/>
+                  <a:lumOff val="40000"/>
+                </a:schemeClr>
+              </a:solidFill>
+            </a:endParaRPr>
+          </a:p>
+          <a:p>
+            <a:endParaRPr lang="en-US" dirty="0"/>
+          </a:p>
+          <a:p>
+            <a:endParaRPr lang="en-US" dirty="0"/>
+          </a:p>
+          <a:p>
+            <a:endParaRPr lang="en-US" dirty="0"/>
+          </a:p>
+          <a:p>
+            <a:endParaRPr lang="en-US" dirty="0"/>
+          </a:p>
+          <a:p>
+            <a:endParaRPr lang="en-US" dirty="0"/>
+          </a:p>
+        </p:txBody>
+      </p:sp>
+      <p:sp>
+        <p:nvSpPr>
+          <p:cNvPr id="15" name="Title 14">
+            <a:extLst>
+              <a:ext uri="{FF2B5EF4-FFF2-40B4-BE49-F238E27FC236}">
+                <a16:creationId xmlns:a16="http://schemas.microsoft.com/office/drawing/2014/main" id="{DD5971B8-AEDF-4A4F-A785-3ABA81D954C9}"/>
+              </a:ext>
+            </a:extLst>
+          </p:cNvPr>
+          <p:cNvSpPr>
+            <a:spLocks noGrp="1"/>
+          </p:cNvSpPr>
+          <p:nvPr>
+            <p:ph type="title"/>
+          </p:nvPr>
+        </p:nvSpPr>
+        <p:spPr>
+          <a:xfrm>
+            <a:off x="677333" y="609600"/>
+            <a:ext cx="4878077" cy="632791"/>
+          </a:xfrm>
+        </p:spPr>
+        <p:txBody>
+          <a:bodyPr>
+            <a:normAutofit fontScale="90000"/>
+          </a:bodyPr>
+          <a:lstStyle/>
+          <a:p>
+            <a:r>
+              <a:rPr lang="en-US" dirty="0"/>
+              <a:t>Process and Thread state</a:t>
+            </a:r>
           </a:p>
         </p:txBody>
       </p:sp>
     </p:spTree>
     <p:extLst>
       <p:ext uri="{BB962C8B-B14F-4D97-AF65-F5344CB8AC3E}">
-        <p14:creationId xmlns:p14="http://schemas.microsoft.com/office/powerpoint/2010/main" val="3998777308"/>
+        <p14:creationId xmlns:p14="http://schemas.microsoft.com/office/powerpoint/2010/main" val="2386835903"/>
       </p:ext>
     </p:extLst>
   </p:cSld>
@@ -7052,628 +7180,7 @@
 </p:sld>
 </file>
 
-<file path=ppt/slides/slide3.xml><?xml version="1.0" encoding="utf-8"?>
-<p:sld xmlns:a="http://schemas.openxmlformats.org/drawingml/2006/main" xmlns:r="http://schemas.openxmlformats.org/officeDocument/2006/relationships" xmlns:p="http://schemas.openxmlformats.org/presentationml/2006/main">
-  <p:cSld>
-    <p:spTree>
-      <p:nvGrpSpPr>
-        <p:cNvPr id="1" name=""/>
-        <p:cNvGrpSpPr/>
-        <p:nvPr/>
-      </p:nvGrpSpPr>
-      <p:grpSpPr>
-        <a:xfrm>
-          <a:off x="0" y="0"/>
-          <a:ext cx="0" cy="0"/>
-          <a:chOff x="0" y="0"/>
-          <a:chExt cx="0" cy="0"/>
-        </a:xfrm>
-      </p:grpSpPr>
-      <p:sp>
-        <p:nvSpPr>
-          <p:cNvPr id="2" name="Title 1">
-            <a:extLst>
-              <a:ext uri="{FF2B5EF4-FFF2-40B4-BE49-F238E27FC236}">
-                <a16:creationId xmlns:a16="http://schemas.microsoft.com/office/drawing/2014/main" id="{6E840D00-627A-4F0C-A700-A185897ACB82}"/>
-              </a:ext>
-            </a:extLst>
-          </p:cNvPr>
-          <p:cNvSpPr>
-            <a:spLocks noGrp="1"/>
-          </p:cNvSpPr>
-          <p:nvPr>
-            <p:ph type="title"/>
-          </p:nvPr>
-        </p:nvSpPr>
-        <p:spPr>
-          <a:xfrm>
-            <a:off x="677334" y="609600"/>
-            <a:ext cx="8596668" cy="1320800"/>
-          </a:xfrm>
-        </p:spPr>
-        <p:txBody>
-          <a:bodyPr/>
-          <a:lstStyle/>
-          <a:p>
-            <a:r>
-              <a:rPr lang="en-US" dirty="0"/>
-              <a:t>Introduction</a:t>
-            </a:r>
-          </a:p>
-        </p:txBody>
-      </p:sp>
-      <p:sp>
-        <p:nvSpPr>
-          <p:cNvPr id="3" name="Content Placeholder 2">
-            <a:extLst>
-              <a:ext uri="{FF2B5EF4-FFF2-40B4-BE49-F238E27FC236}">
-                <a16:creationId xmlns:a16="http://schemas.microsoft.com/office/drawing/2014/main" id="{2F9BC240-1958-4FC0-B473-81E035FD2E1E}"/>
-              </a:ext>
-            </a:extLst>
-          </p:cNvPr>
-          <p:cNvSpPr>
-            <a:spLocks noGrp="1"/>
-          </p:cNvSpPr>
-          <p:nvPr>
-            <p:ph idx="1"/>
-          </p:nvPr>
-        </p:nvSpPr>
-        <p:spPr>
-          <a:xfrm>
-            <a:off x="677334" y="2160589"/>
-            <a:ext cx="8596668" cy="3880773"/>
-          </a:xfrm>
-        </p:spPr>
-        <p:txBody>
-          <a:bodyPr/>
-          <a:lstStyle/>
-          <a:p>
-            <a:r>
-              <a:rPr lang="en-US" dirty="0"/>
-              <a:t>The problem of thread scheduling has been around a while. For a while it was unchanged, until hardware developments made the problem more complex.</a:t>
-            </a:r>
-          </a:p>
-          <a:p>
-            <a:r>
-              <a:rPr lang="en-US" dirty="0"/>
-              <a:t>Make case for importance of maximal efficiency on system programs and algorithms “Execution on the Critical Path”</a:t>
-            </a:r>
-          </a:p>
-          <a:p>
-            <a:endParaRPr lang="en-US" dirty="0"/>
-          </a:p>
-        </p:txBody>
-      </p:sp>
-    </p:spTree>
-    <p:extLst>
-      <p:ext uri="{BB962C8B-B14F-4D97-AF65-F5344CB8AC3E}">
-        <p14:creationId xmlns:p14="http://schemas.microsoft.com/office/powerpoint/2010/main" val="286039908"/>
-      </p:ext>
-    </p:extLst>
-  </p:cSld>
-  <p:clrMapOvr>
-    <a:masterClrMapping/>
-  </p:clrMapOvr>
-</p:sld>
-</file>
-
-<file path=ppt/slides/slide4.xml><?xml version="1.0" encoding="utf-8"?>
-<p:sld xmlns:a="http://schemas.openxmlformats.org/drawingml/2006/main" xmlns:r="http://schemas.openxmlformats.org/officeDocument/2006/relationships" xmlns:p="http://schemas.openxmlformats.org/presentationml/2006/main">
-  <p:cSld>
-    <p:spTree>
-      <p:nvGrpSpPr>
-        <p:cNvPr id="1" name=""/>
-        <p:cNvGrpSpPr/>
-        <p:nvPr/>
-      </p:nvGrpSpPr>
-      <p:grpSpPr>
-        <a:xfrm>
-          <a:off x="0" y="0"/>
-          <a:ext cx="0" cy="0"/>
-          <a:chOff x="0" y="0"/>
-          <a:chExt cx="0" cy="0"/>
-        </a:xfrm>
-      </p:grpSpPr>
-      <p:sp>
-        <p:nvSpPr>
-          <p:cNvPr id="2" name="Title 1">
-            <a:extLst>
-              <a:ext uri="{FF2B5EF4-FFF2-40B4-BE49-F238E27FC236}">
-                <a16:creationId xmlns:a16="http://schemas.microsoft.com/office/drawing/2014/main" id="{DCF92C05-1C98-453A-93C4-50D0A0132DD8}"/>
-              </a:ext>
-            </a:extLst>
-          </p:cNvPr>
-          <p:cNvSpPr>
-            <a:spLocks noGrp="1"/>
-          </p:cNvSpPr>
-          <p:nvPr>
-            <p:ph type="title"/>
-          </p:nvPr>
-        </p:nvSpPr>
-        <p:spPr/>
-        <p:txBody>
-          <a:bodyPr/>
-          <a:lstStyle/>
-          <a:p>
-            <a:r>
-              <a:rPr lang="en-US" dirty="0"/>
-              <a:t>Overview</a:t>
-            </a:r>
-          </a:p>
-        </p:txBody>
-      </p:sp>
-      <p:sp>
-        <p:nvSpPr>
-          <p:cNvPr id="3" name="Content Placeholder 2">
-            <a:extLst>
-              <a:ext uri="{FF2B5EF4-FFF2-40B4-BE49-F238E27FC236}">
-                <a16:creationId xmlns:a16="http://schemas.microsoft.com/office/drawing/2014/main" id="{17803503-BB9B-4A29-AEA2-68B073ED6A74}"/>
-              </a:ext>
-            </a:extLst>
-          </p:cNvPr>
-          <p:cNvSpPr>
-            <a:spLocks noGrp="1"/>
-          </p:cNvSpPr>
-          <p:nvPr>
-            <p:ph idx="1"/>
-          </p:nvPr>
-        </p:nvSpPr>
-        <p:spPr/>
-        <p:txBody>
-          <a:bodyPr/>
-          <a:lstStyle/>
-          <a:p>
-            <a:r>
-              <a:rPr lang="en-US" dirty="0"/>
-              <a:t>Establish needed concepts</a:t>
-            </a:r>
-          </a:p>
-          <a:p>
-            <a:r>
-              <a:rPr lang="en-US" dirty="0"/>
-              <a:t>Thread scheduling and thread load-balancing on Linux</a:t>
-            </a:r>
-          </a:p>
-          <a:p>
-            <a:r>
-              <a:rPr lang="en-US" dirty="0"/>
-              <a:t>Bug fixes and new developments to the Linux thread scheduler</a:t>
-            </a:r>
-          </a:p>
-        </p:txBody>
-      </p:sp>
-    </p:spTree>
-    <p:extLst>
-      <p:ext uri="{BB962C8B-B14F-4D97-AF65-F5344CB8AC3E}">
-        <p14:creationId xmlns:p14="http://schemas.microsoft.com/office/powerpoint/2010/main" val="878520349"/>
-      </p:ext>
-    </p:extLst>
-  </p:cSld>
-  <p:clrMapOvr>
-    <a:masterClrMapping/>
-  </p:clrMapOvr>
-</p:sld>
-</file>
-
-<file path=ppt/slides/slide5.xml><?xml version="1.0" encoding="utf-8"?>
-<p:sld xmlns:a="http://schemas.openxmlformats.org/drawingml/2006/main" xmlns:r="http://schemas.openxmlformats.org/officeDocument/2006/relationships" xmlns:p="http://schemas.openxmlformats.org/presentationml/2006/main">
-  <p:cSld>
-    <p:spTree>
-      <p:nvGrpSpPr>
-        <p:cNvPr id="1" name=""/>
-        <p:cNvGrpSpPr/>
-        <p:nvPr/>
-      </p:nvGrpSpPr>
-      <p:grpSpPr>
-        <a:xfrm>
-          <a:off x="0" y="0"/>
-          <a:ext cx="0" cy="0"/>
-          <a:chOff x="0" y="0"/>
-          <a:chExt cx="0" cy="0"/>
-        </a:xfrm>
-      </p:grpSpPr>
-      <p:sp>
-        <p:nvSpPr>
-          <p:cNvPr id="2" name="Title 1">
-            <a:extLst>
-              <a:ext uri="{FF2B5EF4-FFF2-40B4-BE49-F238E27FC236}">
-                <a16:creationId xmlns:a16="http://schemas.microsoft.com/office/drawing/2014/main" id="{BDD0509A-6666-45C3-8F03-D2600104FFEE}"/>
-              </a:ext>
-            </a:extLst>
-          </p:cNvPr>
-          <p:cNvSpPr>
-            <a:spLocks noGrp="1"/>
-          </p:cNvSpPr>
-          <p:nvPr>
-            <p:ph type="title"/>
-          </p:nvPr>
-        </p:nvSpPr>
-        <p:spPr/>
-        <p:txBody>
-          <a:bodyPr/>
-          <a:lstStyle/>
-          <a:p>
-            <a:r>
-              <a:rPr lang="en-US" dirty="0"/>
-              <a:t>Outline</a:t>
-            </a:r>
-          </a:p>
-        </p:txBody>
-      </p:sp>
-      <p:sp>
-        <p:nvSpPr>
-          <p:cNvPr id="3" name="Content Placeholder 2">
-            <a:extLst>
-              <a:ext uri="{FF2B5EF4-FFF2-40B4-BE49-F238E27FC236}">
-                <a16:creationId xmlns:a16="http://schemas.microsoft.com/office/drawing/2014/main" id="{5D73516D-08C5-41D9-94BA-396221B63085}"/>
-              </a:ext>
-            </a:extLst>
-          </p:cNvPr>
-          <p:cNvSpPr>
-            <a:spLocks noGrp="1"/>
-          </p:cNvSpPr>
-          <p:nvPr>
-            <p:ph idx="1"/>
-          </p:nvPr>
-        </p:nvSpPr>
-        <p:spPr/>
-        <p:txBody>
-          <a:bodyPr/>
-          <a:lstStyle/>
-          <a:p>
-            <a:r>
-              <a:rPr lang="en-US" dirty="0"/>
-              <a:t>Establish needed concepts</a:t>
-            </a:r>
-          </a:p>
-          <a:p>
-            <a:pPr lvl="1"/>
-            <a:r>
-              <a:rPr lang="en-US" dirty="0"/>
-              <a:t>Threads, Multithreading Programs</a:t>
-            </a:r>
-          </a:p>
-          <a:p>
-            <a:pPr lvl="1"/>
-            <a:r>
-              <a:rPr lang="en-US" dirty="0"/>
-              <a:t>Parallel programming</a:t>
-            </a:r>
-          </a:p>
-          <a:p>
-            <a:r>
-              <a:rPr lang="en-US" dirty="0">
-                <a:solidFill>
-                  <a:schemeClr val="accent1">
-                    <a:lumMod val="75000"/>
-                  </a:schemeClr>
-                </a:solidFill>
-              </a:rPr>
-              <a:t>Thread scheduling and thread load-balancing on Linux</a:t>
-            </a:r>
-          </a:p>
-          <a:p>
-            <a:r>
-              <a:rPr lang="en-US" dirty="0">
-                <a:solidFill>
-                  <a:schemeClr val="accent1">
-                    <a:lumMod val="75000"/>
-                  </a:schemeClr>
-                </a:solidFill>
-              </a:rPr>
-              <a:t>Bug fixes and new developments to the Linux thread scheduler</a:t>
-            </a:r>
-          </a:p>
-          <a:p>
-            <a:pPr lvl="1"/>
-            <a:endParaRPr lang="en-US" dirty="0"/>
-          </a:p>
-          <a:p>
-            <a:pPr lvl="2"/>
-            <a:endParaRPr lang="en-US" dirty="0"/>
-          </a:p>
-        </p:txBody>
-      </p:sp>
-    </p:spTree>
-    <p:extLst>
-      <p:ext uri="{BB962C8B-B14F-4D97-AF65-F5344CB8AC3E}">
-        <p14:creationId xmlns:p14="http://schemas.microsoft.com/office/powerpoint/2010/main" val="1957347650"/>
-      </p:ext>
-    </p:extLst>
-  </p:cSld>
-  <p:clrMapOvr>
-    <a:masterClrMapping/>
-  </p:clrMapOvr>
-</p:sld>
-</file>
-
-<file path=ppt/slides/slide6.xml><?xml version="1.0" encoding="utf-8"?>
-<p:sld xmlns:a="http://schemas.openxmlformats.org/drawingml/2006/main" xmlns:r="http://schemas.openxmlformats.org/officeDocument/2006/relationships" xmlns:p="http://schemas.openxmlformats.org/presentationml/2006/main">
-  <p:cSld>
-    <p:spTree>
-      <p:nvGrpSpPr>
-        <p:cNvPr id="1" name=""/>
-        <p:cNvGrpSpPr/>
-        <p:nvPr/>
-      </p:nvGrpSpPr>
-      <p:grpSpPr>
-        <a:xfrm>
-          <a:off x="0" y="0"/>
-          <a:ext cx="0" cy="0"/>
-          <a:chOff x="0" y="0"/>
-          <a:chExt cx="0" cy="0"/>
-        </a:xfrm>
-      </p:grpSpPr>
-      <p:sp>
-        <p:nvSpPr>
-          <p:cNvPr id="2" name="Title 1">
-            <a:extLst>
-              <a:ext uri="{FF2B5EF4-FFF2-40B4-BE49-F238E27FC236}">
-                <a16:creationId xmlns:a16="http://schemas.microsoft.com/office/drawing/2014/main" id="{BDD0509A-6666-45C3-8F03-D2600104FFEE}"/>
-              </a:ext>
-            </a:extLst>
-          </p:cNvPr>
-          <p:cNvSpPr>
-            <a:spLocks noGrp="1"/>
-          </p:cNvSpPr>
-          <p:nvPr>
-            <p:ph type="title"/>
-          </p:nvPr>
-        </p:nvSpPr>
-        <p:spPr/>
-        <p:txBody>
-          <a:bodyPr/>
-          <a:lstStyle/>
-          <a:p>
-            <a:r>
-              <a:rPr lang="en-US" dirty="0"/>
-              <a:t>Outline</a:t>
-            </a:r>
-          </a:p>
-        </p:txBody>
-      </p:sp>
-      <p:sp>
-        <p:nvSpPr>
-          <p:cNvPr id="3" name="Content Placeholder 2">
-            <a:extLst>
-              <a:ext uri="{FF2B5EF4-FFF2-40B4-BE49-F238E27FC236}">
-                <a16:creationId xmlns:a16="http://schemas.microsoft.com/office/drawing/2014/main" id="{5D73516D-08C5-41D9-94BA-396221B63085}"/>
-              </a:ext>
-            </a:extLst>
-          </p:cNvPr>
-          <p:cNvSpPr>
-            <a:spLocks noGrp="1"/>
-          </p:cNvSpPr>
-          <p:nvPr>
-            <p:ph idx="1"/>
-          </p:nvPr>
-        </p:nvSpPr>
-        <p:spPr/>
-        <p:txBody>
-          <a:bodyPr/>
-          <a:lstStyle/>
-          <a:p>
-            <a:r>
-              <a:rPr lang="en-US" dirty="0">
-                <a:solidFill>
-                  <a:schemeClr val="accent1">
-                    <a:lumMod val="75000"/>
-                  </a:schemeClr>
-                </a:solidFill>
-              </a:rPr>
-              <a:t>Establish needed concepts</a:t>
-            </a:r>
-          </a:p>
-          <a:p>
-            <a:r>
-              <a:rPr lang="en-US" dirty="0">
-                <a:solidFill>
-                  <a:schemeClr val="tx1"/>
-                </a:solidFill>
-              </a:rPr>
-              <a:t>Thread scheduling and load-balancing on Linux</a:t>
-            </a:r>
-          </a:p>
-          <a:p>
-            <a:pPr lvl="1"/>
-            <a:r>
-              <a:rPr lang="en-US" dirty="0">
-                <a:solidFill>
-                  <a:schemeClr val="tx1"/>
-                </a:solidFill>
-              </a:rPr>
-              <a:t>Completely Fair Scheduler (CFS)</a:t>
-            </a:r>
-          </a:p>
-          <a:p>
-            <a:pPr lvl="1"/>
-            <a:r>
-              <a:rPr lang="en-US" dirty="0">
-                <a:solidFill>
-                  <a:schemeClr val="tx1"/>
-                </a:solidFill>
-              </a:rPr>
-              <a:t>Scheduling Domains on non-uniform memory access (NUMA) systems</a:t>
-            </a:r>
-          </a:p>
-          <a:p>
-            <a:pPr lvl="1"/>
-            <a:r>
-              <a:rPr lang="en-US" dirty="0">
-                <a:solidFill>
-                  <a:schemeClr val="tx1"/>
-                </a:solidFill>
-              </a:rPr>
-              <a:t>Load Balance algorithm for the CFS</a:t>
-            </a:r>
-          </a:p>
-          <a:p>
-            <a:r>
-              <a:rPr lang="en-US" dirty="0">
-                <a:solidFill>
-                  <a:schemeClr val="accent1">
-                    <a:lumMod val="75000"/>
-                  </a:schemeClr>
-                </a:solidFill>
-              </a:rPr>
-              <a:t>Bug fixes and new developments to the Linux thread scheduler</a:t>
-            </a:r>
-          </a:p>
-          <a:p>
-            <a:pPr lvl="1"/>
-            <a:endParaRPr lang="en-US" dirty="0"/>
-          </a:p>
-          <a:p>
-            <a:pPr lvl="2"/>
-            <a:endParaRPr lang="en-US" dirty="0"/>
-          </a:p>
-        </p:txBody>
-      </p:sp>
-    </p:spTree>
-    <p:extLst>
-      <p:ext uri="{BB962C8B-B14F-4D97-AF65-F5344CB8AC3E}">
-        <p14:creationId xmlns:p14="http://schemas.microsoft.com/office/powerpoint/2010/main" val="3175680182"/>
-      </p:ext>
-    </p:extLst>
-  </p:cSld>
-  <p:clrMapOvr>
-    <a:masterClrMapping/>
-  </p:clrMapOvr>
-</p:sld>
-</file>
-
-<file path=ppt/slides/slide7.xml><?xml version="1.0" encoding="utf-8"?>
-<p:sld xmlns:a="http://schemas.openxmlformats.org/drawingml/2006/main" xmlns:r="http://schemas.openxmlformats.org/officeDocument/2006/relationships" xmlns:p="http://schemas.openxmlformats.org/presentationml/2006/main">
-  <p:cSld>
-    <p:spTree>
-      <p:nvGrpSpPr>
-        <p:cNvPr id="1" name=""/>
-        <p:cNvGrpSpPr/>
-        <p:nvPr/>
-      </p:nvGrpSpPr>
-      <p:grpSpPr>
-        <a:xfrm>
-          <a:off x="0" y="0"/>
-          <a:ext cx="0" cy="0"/>
-          <a:chOff x="0" y="0"/>
-          <a:chExt cx="0" cy="0"/>
-        </a:xfrm>
-      </p:grpSpPr>
-      <p:sp>
-        <p:nvSpPr>
-          <p:cNvPr id="2" name="Title 1">
-            <a:extLst>
-              <a:ext uri="{FF2B5EF4-FFF2-40B4-BE49-F238E27FC236}">
-                <a16:creationId xmlns:a16="http://schemas.microsoft.com/office/drawing/2014/main" id="{EEB5F2EC-4AE3-4FB5-B1B5-9D6102455DBF}"/>
-              </a:ext>
-            </a:extLst>
-          </p:cNvPr>
-          <p:cNvSpPr>
-            <a:spLocks noGrp="1"/>
-          </p:cNvSpPr>
-          <p:nvPr>
-            <p:ph type="title"/>
-          </p:nvPr>
-        </p:nvSpPr>
-        <p:spPr/>
-        <p:txBody>
-          <a:bodyPr/>
-          <a:lstStyle/>
-          <a:p>
-            <a:r>
-              <a:rPr lang="en-US" dirty="0"/>
-              <a:t>Completely Fair Scheduler (CFS)</a:t>
-            </a:r>
-          </a:p>
-        </p:txBody>
-      </p:sp>
-      <p:sp>
-        <p:nvSpPr>
-          <p:cNvPr id="3" name="Content Placeholder 2">
-            <a:extLst>
-              <a:ext uri="{FF2B5EF4-FFF2-40B4-BE49-F238E27FC236}">
-                <a16:creationId xmlns:a16="http://schemas.microsoft.com/office/drawing/2014/main" id="{0C32515D-2D7F-4F44-8E64-A7E3EB354FA4}"/>
-              </a:ext>
-            </a:extLst>
-          </p:cNvPr>
-          <p:cNvSpPr>
-            <a:spLocks noGrp="1"/>
-          </p:cNvSpPr>
-          <p:nvPr>
-            <p:ph idx="1"/>
-          </p:nvPr>
-        </p:nvSpPr>
-        <p:spPr>
-          <a:xfrm>
-            <a:off x="677334" y="2160589"/>
-            <a:ext cx="8596668" cy="4165396"/>
-          </a:xfrm>
-        </p:spPr>
-        <p:txBody>
-          <a:bodyPr/>
-          <a:lstStyle/>
-          <a:p>
-            <a:r>
-              <a:rPr lang="en-US" dirty="0"/>
-              <a:t>Linux Thread Scheduler</a:t>
-            </a:r>
-          </a:p>
-          <a:p>
-            <a:r>
-              <a:rPr lang="en-US" dirty="0"/>
-              <a:t>Handles which threads are executed at what times and on which CPU cores</a:t>
-            </a:r>
-          </a:p>
-          <a:p>
-            <a:r>
-              <a:rPr lang="en-US" dirty="0"/>
-              <a:t>Spend a “fair” amount of runtime on all threads</a:t>
-            </a:r>
-          </a:p>
-          <a:p>
-            <a:endParaRPr lang="en-US" dirty="0"/>
-          </a:p>
-          <a:p>
-            <a:endParaRPr lang="en-US" dirty="0"/>
-          </a:p>
-          <a:p>
-            <a:pPr marL="0" indent="0">
-              <a:buNone/>
-            </a:pPr>
-            <a:endParaRPr lang="en-US" dirty="0"/>
-          </a:p>
-          <a:p>
-            <a:r>
-              <a:rPr lang="en-US" dirty="0"/>
-              <a:t>For now, let’s assume one single core CPU</a:t>
-            </a:r>
-          </a:p>
-          <a:p>
-            <a:r>
-              <a:rPr lang="en-US" dirty="0"/>
-              <a:t>The CFS implementation is simple for a single-core system</a:t>
-            </a:r>
-          </a:p>
-          <a:p>
-            <a:pPr lvl="1"/>
-            <a:endParaRPr lang="en-US" dirty="0"/>
-          </a:p>
-        </p:txBody>
-      </p:sp>
-    </p:spTree>
-    <p:extLst>
-      <p:ext uri="{BB962C8B-B14F-4D97-AF65-F5344CB8AC3E}">
-        <p14:creationId xmlns:p14="http://schemas.microsoft.com/office/powerpoint/2010/main" val="3479385123"/>
-      </p:ext>
-    </p:extLst>
-  </p:cSld>
-  <p:clrMapOvr>
-    <a:masterClrMapping/>
-  </p:clrMapOvr>
-</p:sld>
-</file>
-
-<file path=ppt/slides/slide8.xml><?xml version="1.0" encoding="utf-8"?>
+<file path=ppt/slides/slide16.xml><?xml version="1.0" encoding="utf-8"?>
 <p:sld xmlns:a="http://schemas.openxmlformats.org/drawingml/2006/main" xmlns:r="http://schemas.openxmlformats.org/officeDocument/2006/relationships" xmlns:p="http://schemas.openxmlformats.org/presentationml/2006/main">
   <p:cSld>
     <p:spTree>
@@ -8831,7 +8338,7 @@
 </p:sld>
 </file>
 
-<file path=ppt/slides/slide9.xml><?xml version="1.0" encoding="utf-8"?>
+<file path=ppt/slides/slide17.xml><?xml version="1.0" encoding="utf-8"?>
 <p:sld xmlns:a="http://schemas.openxmlformats.org/drawingml/2006/main" xmlns:r="http://schemas.openxmlformats.org/officeDocument/2006/relationships" xmlns:p="http://schemas.openxmlformats.org/presentationml/2006/main">
   <p:cSld>
     <p:spTree>
@@ -9408,6 +8915,1882 @@
     <p:extLst>
       <p:ext uri="{BB962C8B-B14F-4D97-AF65-F5344CB8AC3E}">
         <p14:creationId xmlns:p14="http://schemas.microsoft.com/office/powerpoint/2010/main" val="196350658"/>
+      </p:ext>
+    </p:extLst>
+  </p:cSld>
+  <p:clrMapOvr>
+    <a:masterClrMapping/>
+  </p:clrMapOvr>
+</p:sld>
+</file>
+
+<file path=ppt/slides/slide18.xml><?xml version="1.0" encoding="utf-8"?>
+<p:sld xmlns:a="http://schemas.openxmlformats.org/drawingml/2006/main" xmlns:r="http://schemas.openxmlformats.org/officeDocument/2006/relationships" xmlns:p="http://schemas.openxmlformats.org/presentationml/2006/main">
+  <p:cSld>
+    <p:spTree>
+      <p:nvGrpSpPr>
+        <p:cNvPr id="1" name=""/>
+        <p:cNvGrpSpPr/>
+        <p:nvPr/>
+      </p:nvGrpSpPr>
+      <p:grpSpPr>
+        <a:xfrm>
+          <a:off x="0" y="0"/>
+          <a:ext cx="0" cy="0"/>
+          <a:chOff x="0" y="0"/>
+          <a:chExt cx="0" cy="0"/>
+        </a:xfrm>
+      </p:grpSpPr>
+      <p:sp>
+        <p:nvSpPr>
+          <p:cNvPr id="2" name="Title 1">
+            <a:extLst>
+              <a:ext uri="{FF2B5EF4-FFF2-40B4-BE49-F238E27FC236}">
+                <a16:creationId xmlns:a16="http://schemas.microsoft.com/office/drawing/2014/main" id="{5AC9455C-C24E-46B5-8157-7C60F65C59DC}"/>
+              </a:ext>
+            </a:extLst>
+          </p:cNvPr>
+          <p:cNvSpPr>
+            <a:spLocks noGrp="1"/>
+          </p:cNvSpPr>
+          <p:nvPr>
+            <p:ph type="title"/>
+          </p:nvPr>
+        </p:nvSpPr>
+        <p:spPr/>
+        <p:txBody>
+          <a:bodyPr/>
+          <a:lstStyle/>
+          <a:p>
+            <a:r>
+              <a:rPr lang="en-US" dirty="0"/>
+              <a:t>Multiple </a:t>
+            </a:r>
+            <a:r>
+              <a:rPr lang="en-US" dirty="0" err="1"/>
+              <a:t>Runqueues</a:t>
+            </a:r>
+            <a:endParaRPr lang="en-US" dirty="0"/>
+          </a:p>
+        </p:txBody>
+      </p:sp>
+      <p:sp>
+        <p:nvSpPr>
+          <p:cNvPr id="3" name="Content Placeholder 2">
+            <a:extLst>
+              <a:ext uri="{FF2B5EF4-FFF2-40B4-BE49-F238E27FC236}">
+                <a16:creationId xmlns:a16="http://schemas.microsoft.com/office/drawing/2014/main" id="{FEED6BAF-D70D-4353-A488-83A8AC526FA7}"/>
+              </a:ext>
+            </a:extLst>
+          </p:cNvPr>
+          <p:cNvSpPr>
+            <a:spLocks noGrp="1"/>
+          </p:cNvSpPr>
+          <p:nvPr>
+            <p:ph idx="1"/>
+          </p:nvPr>
+        </p:nvSpPr>
+        <p:spPr/>
+        <p:txBody>
+          <a:bodyPr/>
+          <a:lstStyle/>
+          <a:p>
+            <a:r>
+              <a:rPr lang="en-US" dirty="0"/>
+              <a:t>Context Switching is expensive across cores</a:t>
+            </a:r>
+          </a:p>
+          <a:p>
+            <a:r>
+              <a:rPr lang="en-US" dirty="0"/>
+              <a:t>Multicore systems need multiple </a:t>
+            </a:r>
+            <a:r>
+              <a:rPr lang="en-US" dirty="0" err="1"/>
+              <a:t>runqueues</a:t>
+            </a:r>
+            <a:r>
+              <a:rPr lang="en-US" dirty="0"/>
+              <a:t> to minimize context switches</a:t>
+            </a:r>
+          </a:p>
+          <a:p>
+            <a:endParaRPr lang="en-US" dirty="0"/>
+          </a:p>
+        </p:txBody>
+      </p:sp>
+    </p:spTree>
+    <p:extLst>
+      <p:ext uri="{BB962C8B-B14F-4D97-AF65-F5344CB8AC3E}">
+        <p14:creationId xmlns:p14="http://schemas.microsoft.com/office/powerpoint/2010/main" val="324779882"/>
+      </p:ext>
+    </p:extLst>
+  </p:cSld>
+  <p:clrMapOvr>
+    <a:masterClrMapping/>
+  </p:clrMapOvr>
+</p:sld>
+</file>
+
+<file path=ppt/slides/slide19.xml><?xml version="1.0" encoding="utf-8"?>
+<p:sld xmlns:a="http://schemas.openxmlformats.org/drawingml/2006/main" xmlns:r="http://schemas.openxmlformats.org/officeDocument/2006/relationships" xmlns:p="http://schemas.openxmlformats.org/presentationml/2006/main">
+  <p:cSld>
+    <p:spTree>
+      <p:nvGrpSpPr>
+        <p:cNvPr id="1" name=""/>
+        <p:cNvGrpSpPr/>
+        <p:nvPr/>
+      </p:nvGrpSpPr>
+      <p:grpSpPr>
+        <a:xfrm>
+          <a:off x="0" y="0"/>
+          <a:ext cx="0" cy="0"/>
+          <a:chOff x="0" y="0"/>
+          <a:chExt cx="0" cy="0"/>
+        </a:xfrm>
+      </p:grpSpPr>
+      <p:sp>
+        <p:nvSpPr>
+          <p:cNvPr id="2" name="Title 1">
+            <a:extLst>
+              <a:ext uri="{FF2B5EF4-FFF2-40B4-BE49-F238E27FC236}">
+                <a16:creationId xmlns:a16="http://schemas.microsoft.com/office/drawing/2014/main" id="{BDD0509A-6666-45C3-8F03-D2600104FFEE}"/>
+              </a:ext>
+            </a:extLst>
+          </p:cNvPr>
+          <p:cNvSpPr>
+            <a:spLocks noGrp="1"/>
+          </p:cNvSpPr>
+          <p:nvPr>
+            <p:ph type="title"/>
+          </p:nvPr>
+        </p:nvSpPr>
+        <p:spPr/>
+        <p:txBody>
+          <a:bodyPr/>
+          <a:lstStyle/>
+          <a:p>
+            <a:r>
+              <a:rPr lang="en-US" dirty="0"/>
+              <a:t>Outline</a:t>
+            </a:r>
+          </a:p>
+        </p:txBody>
+      </p:sp>
+      <p:sp>
+        <p:nvSpPr>
+          <p:cNvPr id="3" name="Content Placeholder 2">
+            <a:extLst>
+              <a:ext uri="{FF2B5EF4-FFF2-40B4-BE49-F238E27FC236}">
+                <a16:creationId xmlns:a16="http://schemas.microsoft.com/office/drawing/2014/main" id="{5D73516D-08C5-41D9-94BA-396221B63085}"/>
+              </a:ext>
+            </a:extLst>
+          </p:cNvPr>
+          <p:cNvSpPr>
+            <a:spLocks noGrp="1"/>
+          </p:cNvSpPr>
+          <p:nvPr>
+            <p:ph idx="1"/>
+          </p:nvPr>
+        </p:nvSpPr>
+        <p:spPr/>
+        <p:txBody>
+          <a:bodyPr/>
+          <a:lstStyle/>
+          <a:p>
+            <a:r>
+              <a:rPr lang="en-US" dirty="0">
+                <a:solidFill>
+                  <a:schemeClr val="accent1">
+                    <a:lumMod val="75000"/>
+                  </a:schemeClr>
+                </a:solidFill>
+              </a:rPr>
+              <a:t>Establish needed concepts</a:t>
+            </a:r>
+          </a:p>
+          <a:p>
+            <a:r>
+              <a:rPr lang="en-US" dirty="0">
+                <a:solidFill>
+                  <a:schemeClr val="accent1">
+                    <a:lumMod val="75000"/>
+                  </a:schemeClr>
+                </a:solidFill>
+              </a:rPr>
+              <a:t>Thread scheduling and thread load-balancing on Linux</a:t>
+            </a:r>
+          </a:p>
+          <a:p>
+            <a:r>
+              <a:rPr lang="en-US" dirty="0">
+                <a:solidFill>
+                  <a:schemeClr val="tx1"/>
+                </a:solidFill>
+              </a:rPr>
+              <a:t>Bug fixes and two new developments to the Linux thread scheduler</a:t>
+            </a:r>
+          </a:p>
+          <a:p>
+            <a:pPr lvl="1"/>
+            <a:r>
+              <a:rPr lang="en-US" dirty="0"/>
+              <a:t>Four bugs found within current implementation of CFS</a:t>
+            </a:r>
+          </a:p>
+          <a:p>
+            <a:pPr lvl="1"/>
+            <a:r>
+              <a:rPr lang="en-US" dirty="0"/>
+              <a:t>FLSCHED: The lockless thread scheduler</a:t>
+            </a:r>
+          </a:p>
+          <a:p>
+            <a:pPr lvl="1"/>
+            <a:r>
+              <a:rPr lang="en-US" dirty="0"/>
+              <a:t>Shuffler: Cache locality improvements via thread migration</a:t>
+            </a:r>
+          </a:p>
+        </p:txBody>
+      </p:sp>
+    </p:spTree>
+    <p:extLst>
+      <p:ext uri="{BB962C8B-B14F-4D97-AF65-F5344CB8AC3E}">
+        <p14:creationId xmlns:p14="http://schemas.microsoft.com/office/powerpoint/2010/main" val="2043729067"/>
+      </p:ext>
+    </p:extLst>
+  </p:cSld>
+  <p:clrMapOvr>
+    <a:masterClrMapping/>
+  </p:clrMapOvr>
+</p:sld>
+</file>
+
+<file path=ppt/slides/slide2.xml><?xml version="1.0" encoding="utf-8"?>
+<p:sld xmlns:a="http://schemas.openxmlformats.org/drawingml/2006/main" xmlns:r="http://schemas.openxmlformats.org/officeDocument/2006/relationships" xmlns:p="http://schemas.openxmlformats.org/presentationml/2006/main">
+  <p:cSld>
+    <p:spTree>
+      <p:nvGrpSpPr>
+        <p:cNvPr id="1" name=""/>
+        <p:cNvGrpSpPr/>
+        <p:nvPr/>
+      </p:nvGrpSpPr>
+      <p:grpSpPr>
+        <a:xfrm>
+          <a:off x="0" y="0"/>
+          <a:ext cx="0" cy="0"/>
+          <a:chOff x="0" y="0"/>
+          <a:chExt cx="0" cy="0"/>
+        </a:xfrm>
+      </p:grpSpPr>
+      <p:sp>
+        <p:nvSpPr>
+          <p:cNvPr id="2" name="Title 1">
+            <a:extLst>
+              <a:ext uri="{FF2B5EF4-FFF2-40B4-BE49-F238E27FC236}">
+                <a16:creationId xmlns:a16="http://schemas.microsoft.com/office/drawing/2014/main" id="{6E840D00-627A-4F0C-A700-A185897ACB82}"/>
+              </a:ext>
+            </a:extLst>
+          </p:cNvPr>
+          <p:cNvSpPr>
+            <a:spLocks noGrp="1"/>
+          </p:cNvSpPr>
+          <p:nvPr>
+            <p:ph type="title"/>
+          </p:nvPr>
+        </p:nvSpPr>
+        <p:spPr>
+          <a:xfrm>
+            <a:off x="677334" y="609600"/>
+            <a:ext cx="8596668" cy="1320800"/>
+          </a:xfrm>
+        </p:spPr>
+        <p:txBody>
+          <a:bodyPr/>
+          <a:lstStyle/>
+          <a:p>
+            <a:r>
+              <a:rPr lang="en-US" dirty="0"/>
+              <a:t>Introduction</a:t>
+            </a:r>
+          </a:p>
+        </p:txBody>
+      </p:sp>
+      <p:sp>
+        <p:nvSpPr>
+          <p:cNvPr id="3" name="Content Placeholder 2">
+            <a:extLst>
+              <a:ext uri="{FF2B5EF4-FFF2-40B4-BE49-F238E27FC236}">
+                <a16:creationId xmlns:a16="http://schemas.microsoft.com/office/drawing/2014/main" id="{2F9BC240-1958-4FC0-B473-81E035FD2E1E}"/>
+              </a:ext>
+            </a:extLst>
+          </p:cNvPr>
+          <p:cNvSpPr>
+            <a:spLocks noGrp="1"/>
+          </p:cNvSpPr>
+          <p:nvPr>
+            <p:ph idx="1"/>
+          </p:nvPr>
+        </p:nvSpPr>
+        <p:spPr>
+          <a:xfrm>
+            <a:off x="677333" y="2160589"/>
+            <a:ext cx="8794657" cy="3880773"/>
+          </a:xfrm>
+        </p:spPr>
+        <p:txBody>
+          <a:bodyPr/>
+          <a:lstStyle/>
+          <a:p>
+            <a:r>
+              <a:rPr lang="en-US" dirty="0"/>
+              <a:t>The problem of thread scheduling has been around since the 1960s and for a while, scheduling implementation was largely unchanged</a:t>
+            </a:r>
+          </a:p>
+          <a:p>
+            <a:r>
+              <a:rPr lang="en-US" dirty="0"/>
+              <a:t>The thread scheduler is an important system component that is always running</a:t>
+            </a:r>
+          </a:p>
+          <a:p>
+            <a:r>
+              <a:rPr lang="en-US" dirty="0"/>
+              <a:t>The thread scheduler must be as efficient as possible</a:t>
+            </a:r>
+          </a:p>
+          <a:p>
+            <a:pPr lvl="1"/>
+            <a:r>
+              <a:rPr lang="en-US" dirty="0"/>
+              <a:t>Reduce time spent doing necessary/maintenance tasks (the critical section)</a:t>
+            </a:r>
+          </a:p>
+          <a:p>
+            <a:r>
+              <a:rPr lang="en-US" dirty="0"/>
+              <a:t>Increasing hardware requirements in the early 2000s made the problem more complex</a:t>
+            </a:r>
+          </a:p>
+          <a:p>
+            <a:endParaRPr lang="en-US" dirty="0"/>
+          </a:p>
+        </p:txBody>
+      </p:sp>
+    </p:spTree>
+    <p:extLst>
+      <p:ext uri="{BB962C8B-B14F-4D97-AF65-F5344CB8AC3E}">
+        <p14:creationId xmlns:p14="http://schemas.microsoft.com/office/powerpoint/2010/main" val="286039908"/>
+      </p:ext>
+    </p:extLst>
+  </p:cSld>
+  <p:clrMapOvr>
+    <a:masterClrMapping/>
+  </p:clrMapOvr>
+</p:sld>
+</file>
+
+<file path=ppt/slides/slide20.xml><?xml version="1.0" encoding="utf-8"?>
+<p:sld xmlns:a="http://schemas.openxmlformats.org/drawingml/2006/main" xmlns:r="http://schemas.openxmlformats.org/officeDocument/2006/relationships" xmlns:p="http://schemas.openxmlformats.org/presentationml/2006/main">
+  <p:cSld>
+    <p:spTree>
+      <p:nvGrpSpPr>
+        <p:cNvPr id="1" name=""/>
+        <p:cNvGrpSpPr/>
+        <p:nvPr/>
+      </p:nvGrpSpPr>
+      <p:grpSpPr>
+        <a:xfrm>
+          <a:off x="0" y="0"/>
+          <a:ext cx="0" cy="0"/>
+          <a:chOff x="0" y="0"/>
+          <a:chExt cx="0" cy="0"/>
+        </a:xfrm>
+      </p:grpSpPr>
+      <p:sp>
+        <p:nvSpPr>
+          <p:cNvPr id="2" name="Title 1">
+            <a:extLst>
+              <a:ext uri="{FF2B5EF4-FFF2-40B4-BE49-F238E27FC236}">
+                <a16:creationId xmlns:a16="http://schemas.microsoft.com/office/drawing/2014/main" id="{0010AE82-4563-4896-9624-FF29FC57A3EB}"/>
+              </a:ext>
+            </a:extLst>
+          </p:cNvPr>
+          <p:cNvSpPr>
+            <a:spLocks noGrp="1"/>
+          </p:cNvSpPr>
+          <p:nvPr>
+            <p:ph type="title"/>
+          </p:nvPr>
+        </p:nvSpPr>
+        <p:spPr/>
+        <p:txBody>
+          <a:bodyPr/>
+          <a:lstStyle/>
+          <a:p>
+            <a:endParaRPr lang="en-US"/>
+          </a:p>
+        </p:txBody>
+      </p:sp>
+      <p:sp>
+        <p:nvSpPr>
+          <p:cNvPr id="3" name="Content Placeholder 2">
+            <a:extLst>
+              <a:ext uri="{FF2B5EF4-FFF2-40B4-BE49-F238E27FC236}">
+                <a16:creationId xmlns:a16="http://schemas.microsoft.com/office/drawing/2014/main" id="{57A4FE7C-4BD5-4E49-8853-430E429FBFD3}"/>
+              </a:ext>
+            </a:extLst>
+          </p:cNvPr>
+          <p:cNvSpPr>
+            <a:spLocks noGrp="1"/>
+          </p:cNvSpPr>
+          <p:nvPr>
+            <p:ph idx="1"/>
+          </p:nvPr>
+        </p:nvSpPr>
+        <p:spPr/>
+        <p:txBody>
+          <a:bodyPr/>
+          <a:lstStyle/>
+          <a:p>
+            <a:endParaRPr lang="en-US"/>
+          </a:p>
+        </p:txBody>
+      </p:sp>
+    </p:spTree>
+    <p:extLst>
+      <p:ext uri="{BB962C8B-B14F-4D97-AF65-F5344CB8AC3E}">
+        <p14:creationId xmlns:p14="http://schemas.microsoft.com/office/powerpoint/2010/main" val="3729969146"/>
+      </p:ext>
+    </p:extLst>
+  </p:cSld>
+  <p:clrMapOvr>
+    <a:masterClrMapping/>
+  </p:clrMapOvr>
+</p:sld>
+</file>
+
+<file path=ppt/slides/slide21.xml><?xml version="1.0" encoding="utf-8"?>
+<p:sld xmlns:a="http://schemas.openxmlformats.org/drawingml/2006/main" xmlns:r="http://schemas.openxmlformats.org/officeDocument/2006/relationships" xmlns:p="http://schemas.openxmlformats.org/presentationml/2006/main">
+  <p:cSld>
+    <p:spTree>
+      <p:nvGrpSpPr>
+        <p:cNvPr id="1" name=""/>
+        <p:cNvGrpSpPr/>
+        <p:nvPr/>
+      </p:nvGrpSpPr>
+      <p:grpSpPr>
+        <a:xfrm>
+          <a:off x="0" y="0"/>
+          <a:ext cx="0" cy="0"/>
+          <a:chOff x="0" y="0"/>
+          <a:chExt cx="0" cy="0"/>
+        </a:xfrm>
+      </p:grpSpPr>
+      <p:sp>
+        <p:nvSpPr>
+          <p:cNvPr id="3" name="Content Placeholder 2">
+            <a:extLst>
+              <a:ext uri="{FF2B5EF4-FFF2-40B4-BE49-F238E27FC236}">
+                <a16:creationId xmlns:a16="http://schemas.microsoft.com/office/drawing/2014/main" id="{D83E9CED-5A39-49BF-9563-8FD5937C2082}"/>
+              </a:ext>
+            </a:extLst>
+          </p:cNvPr>
+          <p:cNvSpPr>
+            <a:spLocks noGrp="1"/>
+          </p:cNvSpPr>
+          <p:nvPr>
+            <p:ph idx="1"/>
+          </p:nvPr>
+        </p:nvSpPr>
+        <p:spPr>
+          <a:xfrm>
+            <a:off x="592114" y="1242391"/>
+            <a:ext cx="8661216" cy="4591877"/>
+          </a:xfrm>
+        </p:spPr>
+        <p:txBody>
+          <a:bodyPr>
+            <a:normAutofit/>
+          </a:bodyPr>
+          <a:lstStyle/>
+          <a:p>
+            <a:endParaRPr lang="en-US" dirty="0"/>
+          </a:p>
+        </p:txBody>
+      </p:sp>
+      <p:sp>
+        <p:nvSpPr>
+          <p:cNvPr id="15" name="Title 14">
+            <a:extLst>
+              <a:ext uri="{FF2B5EF4-FFF2-40B4-BE49-F238E27FC236}">
+                <a16:creationId xmlns:a16="http://schemas.microsoft.com/office/drawing/2014/main" id="{DD5971B8-AEDF-4A4F-A785-3ABA81D954C9}"/>
+              </a:ext>
+            </a:extLst>
+          </p:cNvPr>
+          <p:cNvSpPr>
+            <a:spLocks noGrp="1"/>
+          </p:cNvSpPr>
+          <p:nvPr>
+            <p:ph type="title"/>
+          </p:nvPr>
+        </p:nvSpPr>
+        <p:spPr>
+          <a:xfrm>
+            <a:off x="677334" y="609600"/>
+            <a:ext cx="3384712" cy="632791"/>
+          </a:xfrm>
+        </p:spPr>
+        <p:txBody>
+          <a:bodyPr>
+            <a:normAutofit fontScale="90000"/>
+          </a:bodyPr>
+          <a:lstStyle/>
+          <a:p>
+            <a:r>
+              <a:rPr lang="en-US" dirty="0"/>
+              <a:t>Lock Contention</a:t>
+            </a:r>
+          </a:p>
+        </p:txBody>
+      </p:sp>
+    </p:spTree>
+    <p:extLst>
+      <p:ext uri="{BB962C8B-B14F-4D97-AF65-F5344CB8AC3E}">
+        <p14:creationId xmlns:p14="http://schemas.microsoft.com/office/powerpoint/2010/main" val="2578763411"/>
+      </p:ext>
+    </p:extLst>
+  </p:cSld>
+  <p:clrMapOvr>
+    <a:masterClrMapping/>
+  </p:clrMapOvr>
+</p:sld>
+</file>
+
+<file path=ppt/slides/slide22.xml><?xml version="1.0" encoding="utf-8"?>
+<p:sld xmlns:a="http://schemas.openxmlformats.org/drawingml/2006/main" xmlns:r="http://schemas.openxmlformats.org/officeDocument/2006/relationships" xmlns:p="http://schemas.openxmlformats.org/presentationml/2006/main">
+  <p:cSld>
+    <p:spTree>
+      <p:nvGrpSpPr>
+        <p:cNvPr id="1" name=""/>
+        <p:cNvGrpSpPr/>
+        <p:nvPr/>
+      </p:nvGrpSpPr>
+      <p:grpSpPr>
+        <a:xfrm>
+          <a:off x="0" y="0"/>
+          <a:ext cx="0" cy="0"/>
+          <a:chOff x="0" y="0"/>
+          <a:chExt cx="0" cy="0"/>
+        </a:xfrm>
+      </p:grpSpPr>
+      <p:sp>
+        <p:nvSpPr>
+          <p:cNvPr id="2" name="Title 1">
+            <a:extLst>
+              <a:ext uri="{FF2B5EF4-FFF2-40B4-BE49-F238E27FC236}">
+                <a16:creationId xmlns:a16="http://schemas.microsoft.com/office/drawing/2014/main" id="{F95B23F0-1EE8-4BD1-B189-337575BC67EE}"/>
+              </a:ext>
+            </a:extLst>
+          </p:cNvPr>
+          <p:cNvSpPr>
+            <a:spLocks noGrp="1"/>
+          </p:cNvSpPr>
+          <p:nvPr>
+            <p:ph type="title"/>
+          </p:nvPr>
+        </p:nvSpPr>
+        <p:spPr/>
+        <p:txBody>
+          <a:bodyPr/>
+          <a:lstStyle/>
+          <a:p>
+            <a:r>
+              <a:rPr lang="en-US" dirty="0"/>
+              <a:t>Conclusions</a:t>
+            </a:r>
+          </a:p>
+        </p:txBody>
+      </p:sp>
+      <p:sp>
+        <p:nvSpPr>
+          <p:cNvPr id="3" name="Content Placeholder 2">
+            <a:extLst>
+              <a:ext uri="{FF2B5EF4-FFF2-40B4-BE49-F238E27FC236}">
+                <a16:creationId xmlns:a16="http://schemas.microsoft.com/office/drawing/2014/main" id="{BC507F40-A0C7-41CB-9B1E-2E110A1FA36B}"/>
+              </a:ext>
+            </a:extLst>
+          </p:cNvPr>
+          <p:cNvSpPr>
+            <a:spLocks noGrp="1"/>
+          </p:cNvSpPr>
+          <p:nvPr>
+            <p:ph idx="1"/>
+          </p:nvPr>
+        </p:nvSpPr>
+        <p:spPr/>
+        <p:txBody>
+          <a:bodyPr/>
+          <a:lstStyle/>
+          <a:p>
+            <a:endParaRPr lang="en-US"/>
+          </a:p>
+        </p:txBody>
+      </p:sp>
+    </p:spTree>
+    <p:extLst>
+      <p:ext uri="{BB962C8B-B14F-4D97-AF65-F5344CB8AC3E}">
+        <p14:creationId xmlns:p14="http://schemas.microsoft.com/office/powerpoint/2010/main" val="991287881"/>
+      </p:ext>
+    </p:extLst>
+  </p:cSld>
+  <p:clrMapOvr>
+    <a:masterClrMapping/>
+  </p:clrMapOvr>
+</p:sld>
+</file>
+
+<file path=ppt/slides/slide23.xml><?xml version="1.0" encoding="utf-8"?>
+<p:sld xmlns:a="http://schemas.openxmlformats.org/drawingml/2006/main" xmlns:r="http://schemas.openxmlformats.org/officeDocument/2006/relationships" xmlns:p="http://schemas.openxmlformats.org/presentationml/2006/main">
+  <p:cSld>
+    <p:spTree>
+      <p:nvGrpSpPr>
+        <p:cNvPr id="1" name=""/>
+        <p:cNvGrpSpPr/>
+        <p:nvPr/>
+      </p:nvGrpSpPr>
+      <p:grpSpPr>
+        <a:xfrm>
+          <a:off x="0" y="0"/>
+          <a:ext cx="0" cy="0"/>
+          <a:chOff x="0" y="0"/>
+          <a:chExt cx="0" cy="0"/>
+        </a:xfrm>
+      </p:grpSpPr>
+      <p:sp>
+        <p:nvSpPr>
+          <p:cNvPr id="2" name="Title 1">
+            <a:extLst>
+              <a:ext uri="{FF2B5EF4-FFF2-40B4-BE49-F238E27FC236}">
+                <a16:creationId xmlns:a16="http://schemas.microsoft.com/office/drawing/2014/main" id="{66071387-2664-4BBA-A1B9-717F5F04EC6B}"/>
+              </a:ext>
+            </a:extLst>
+          </p:cNvPr>
+          <p:cNvSpPr>
+            <a:spLocks noGrp="1"/>
+          </p:cNvSpPr>
+          <p:nvPr>
+            <p:ph type="title"/>
+          </p:nvPr>
+        </p:nvSpPr>
+        <p:spPr>
+          <a:xfrm>
+            <a:off x="677334" y="362465"/>
+            <a:ext cx="8596668" cy="1320800"/>
+          </a:xfrm>
+        </p:spPr>
+        <p:txBody>
+          <a:bodyPr/>
+          <a:lstStyle/>
+          <a:p>
+            <a:r>
+              <a:rPr lang="en-US" dirty="0"/>
+              <a:t>References</a:t>
+            </a:r>
+          </a:p>
+        </p:txBody>
+      </p:sp>
+      <p:sp>
+        <p:nvSpPr>
+          <p:cNvPr id="3" name="Content Placeholder 2">
+            <a:extLst>
+              <a:ext uri="{FF2B5EF4-FFF2-40B4-BE49-F238E27FC236}">
+                <a16:creationId xmlns:a16="http://schemas.microsoft.com/office/drawing/2014/main" id="{1C7F16B6-7206-424A-BAFA-39935C7949CC}"/>
+              </a:ext>
+            </a:extLst>
+          </p:cNvPr>
+          <p:cNvSpPr>
+            <a:spLocks noGrp="1"/>
+          </p:cNvSpPr>
+          <p:nvPr>
+            <p:ph idx="1"/>
+          </p:nvPr>
+        </p:nvSpPr>
+        <p:spPr>
+          <a:xfrm>
+            <a:off x="677334" y="1466335"/>
+            <a:ext cx="8596668" cy="5067816"/>
+          </a:xfrm>
+        </p:spPr>
+        <p:txBody>
+          <a:bodyPr/>
+          <a:lstStyle/>
+          <a:p>
+            <a:pPr>
+              <a:buFont typeface="+mj-lt"/>
+              <a:buAutoNum type="arabicPeriod"/>
+            </a:pPr>
+            <a:r>
+              <a:rPr lang="en-US" dirty="0">
+                <a:solidFill>
+                  <a:schemeClr val="accent1">
+                    <a:lumMod val="40000"/>
+                    <a:lumOff val="60000"/>
+                  </a:schemeClr>
+                </a:solidFill>
+              </a:rPr>
+              <a:t>K. Kumar, P. Rajiv, G. Laxmi, and N. </a:t>
+            </a:r>
+            <a:r>
+              <a:rPr lang="en-US" dirty="0" err="1">
+                <a:solidFill>
+                  <a:schemeClr val="accent1">
+                    <a:lumMod val="40000"/>
+                    <a:lumOff val="60000"/>
+                  </a:schemeClr>
+                </a:solidFill>
+              </a:rPr>
+              <a:t>Bhuyan</a:t>
+            </a:r>
+            <a:r>
+              <a:rPr lang="en-US" dirty="0">
+                <a:solidFill>
+                  <a:schemeClr val="accent1">
+                    <a:lumMod val="40000"/>
+                    <a:lumOff val="60000"/>
+                  </a:schemeClr>
+                </a:solidFill>
+              </a:rPr>
+              <a:t>.</a:t>
+            </a:r>
+            <a:br>
+              <a:rPr lang="en-US" dirty="0">
+                <a:solidFill>
+                  <a:schemeClr val="accent1">
+                    <a:lumMod val="40000"/>
+                    <a:lumOff val="60000"/>
+                  </a:schemeClr>
+                </a:solidFill>
+              </a:rPr>
+            </a:br>
+            <a:r>
+              <a:rPr lang="en-US" dirty="0"/>
+              <a:t>Shuffling: A framework for lock contention aware thread scheduling for multicore multiprocessor systems.</a:t>
+            </a:r>
+            <a:br>
+              <a:rPr lang="en-US" dirty="0"/>
+            </a:br>
+            <a:r>
+              <a:rPr lang="en-US" dirty="0">
+                <a:solidFill>
+                  <a:schemeClr val="accent1">
+                    <a:lumMod val="60000"/>
+                    <a:lumOff val="40000"/>
+                  </a:schemeClr>
+                </a:solidFill>
+              </a:rPr>
+              <a:t>In 2014 23rd International Conference on Parallel Architecture and Compilation Techniques (PACT), pages 289–300, Aug 2014.</a:t>
+            </a:r>
+          </a:p>
+          <a:p>
+            <a:pPr>
+              <a:buFont typeface="+mj-lt"/>
+              <a:buAutoNum type="arabicPeriod"/>
+            </a:pPr>
+            <a:r>
+              <a:rPr lang="en-US" dirty="0">
+                <a:solidFill>
+                  <a:schemeClr val="accent1">
+                    <a:lumMod val="40000"/>
+                    <a:lumOff val="60000"/>
+                  </a:schemeClr>
+                </a:solidFill>
+              </a:rPr>
+              <a:t>J.-P. </a:t>
+            </a:r>
+            <a:r>
+              <a:rPr lang="en-US" dirty="0" err="1">
+                <a:solidFill>
+                  <a:schemeClr val="accent1">
+                    <a:lumMod val="40000"/>
+                    <a:lumOff val="60000"/>
+                  </a:schemeClr>
+                </a:solidFill>
+              </a:rPr>
+              <a:t>Lozi</a:t>
+            </a:r>
+            <a:r>
+              <a:rPr lang="en-US" dirty="0">
+                <a:solidFill>
+                  <a:schemeClr val="accent1">
+                    <a:lumMod val="40000"/>
+                    <a:lumOff val="60000"/>
+                  </a:schemeClr>
+                </a:solidFill>
+              </a:rPr>
+              <a:t>, B. Lepers, J. Funston, F. Gaud, V. </a:t>
+            </a:r>
+            <a:r>
+              <a:rPr lang="en-US" dirty="0" err="1">
+                <a:solidFill>
+                  <a:schemeClr val="accent1">
+                    <a:lumMod val="40000"/>
+                    <a:lumOff val="60000"/>
+                  </a:schemeClr>
+                </a:solidFill>
+              </a:rPr>
+              <a:t>Quéma</a:t>
+            </a:r>
+            <a:r>
+              <a:rPr lang="en-US" dirty="0">
+                <a:solidFill>
+                  <a:schemeClr val="accent1">
+                    <a:lumMod val="40000"/>
+                    <a:lumOff val="60000"/>
+                  </a:schemeClr>
+                </a:solidFill>
+              </a:rPr>
+              <a:t>, and A. </a:t>
+            </a:r>
+            <a:r>
+              <a:rPr lang="en-US" dirty="0" err="1">
+                <a:solidFill>
+                  <a:schemeClr val="accent1">
+                    <a:lumMod val="40000"/>
+                    <a:lumOff val="60000"/>
+                  </a:schemeClr>
+                </a:solidFill>
+              </a:rPr>
+              <a:t>Fedorova</a:t>
+            </a:r>
+            <a:r>
+              <a:rPr lang="en-US" dirty="0">
+                <a:solidFill>
+                  <a:schemeClr val="accent1">
+                    <a:lumMod val="40000"/>
+                    <a:lumOff val="60000"/>
+                  </a:schemeClr>
+                </a:solidFill>
+              </a:rPr>
+              <a:t>.</a:t>
+            </a:r>
+            <a:br>
+              <a:rPr lang="en-US" dirty="0"/>
+            </a:br>
+            <a:r>
+              <a:rPr lang="en-US" dirty="0"/>
+              <a:t>The </a:t>
+            </a:r>
+            <a:r>
+              <a:rPr lang="en-US" dirty="0" err="1"/>
+              <a:t>linux</a:t>
+            </a:r>
+            <a:r>
+              <a:rPr lang="en-US" dirty="0"/>
+              <a:t> scheduler: A decade of wasted cores.</a:t>
+            </a:r>
+            <a:br>
+              <a:rPr lang="en-US" dirty="0"/>
+            </a:br>
+            <a:r>
+              <a:rPr lang="en-US" dirty="0">
+                <a:solidFill>
+                  <a:schemeClr val="accent1">
+                    <a:lumMod val="60000"/>
+                    <a:lumOff val="40000"/>
+                  </a:schemeClr>
+                </a:solidFill>
+              </a:rPr>
+              <a:t>In Proceedings of the Eleventh European Conference on Computer Systems, </a:t>
+            </a:r>
+            <a:r>
+              <a:rPr lang="en-US" dirty="0" err="1">
+                <a:solidFill>
+                  <a:schemeClr val="accent1">
+                    <a:lumMod val="60000"/>
+                    <a:lumOff val="40000"/>
+                  </a:schemeClr>
+                </a:solidFill>
+              </a:rPr>
+              <a:t>EuroSys</a:t>
+            </a:r>
+            <a:r>
+              <a:rPr lang="en-US" dirty="0">
+                <a:solidFill>
+                  <a:schemeClr val="accent1">
+                    <a:lumMod val="60000"/>
+                    <a:lumOff val="40000"/>
+                  </a:schemeClr>
+                </a:solidFill>
+              </a:rPr>
+              <a:t> ’16, pages 1:1–1:16, New York, NY, USA, 2016. ACM.</a:t>
+            </a:r>
+          </a:p>
+          <a:p>
+            <a:pPr>
+              <a:buFont typeface="+mj-lt"/>
+              <a:buAutoNum type="arabicPeriod"/>
+            </a:pPr>
+            <a:r>
+              <a:rPr lang="en-US" dirty="0">
+                <a:solidFill>
+                  <a:schemeClr val="accent1">
+                    <a:lumMod val="40000"/>
+                    <a:lumOff val="60000"/>
+                  </a:schemeClr>
+                </a:solidFill>
+              </a:rPr>
+              <a:t>U. B. Nisar, M. Aleem, M. A. Iqbal, and N. S. Vo.</a:t>
+            </a:r>
+            <a:br>
+              <a:rPr lang="en-US" dirty="0"/>
+            </a:br>
+            <a:r>
+              <a:rPr lang="en-US" dirty="0"/>
+              <a:t>Jumbler: A lock-contention aware thread scheduler for multi-core parallel machines.</a:t>
+            </a:r>
+            <a:br>
+              <a:rPr lang="en-US" dirty="0"/>
+            </a:br>
+            <a:r>
+              <a:rPr lang="en-US" dirty="0">
+                <a:solidFill>
+                  <a:schemeClr val="accent1">
+                    <a:lumMod val="60000"/>
+                    <a:lumOff val="40000"/>
+                  </a:schemeClr>
+                </a:solidFill>
+              </a:rPr>
+              <a:t>In 2017 International Conference on Recent Advances in Signal Processing, Telecommunications Computing (</a:t>
+            </a:r>
+            <a:r>
+              <a:rPr lang="en-US" dirty="0" err="1">
+                <a:solidFill>
+                  <a:schemeClr val="accent1">
+                    <a:lumMod val="60000"/>
+                    <a:lumOff val="40000"/>
+                  </a:schemeClr>
+                </a:solidFill>
+              </a:rPr>
+              <a:t>SigTelCom</a:t>
+            </a:r>
+            <a:r>
+              <a:rPr lang="en-US" dirty="0">
+                <a:solidFill>
+                  <a:schemeClr val="accent1">
+                    <a:lumMod val="60000"/>
+                    <a:lumOff val="40000"/>
+                  </a:schemeClr>
+                </a:solidFill>
+              </a:rPr>
+              <a:t>), pages 77–81, Jan 2017.</a:t>
+            </a:r>
+          </a:p>
+          <a:p>
+            <a:pPr>
+              <a:buFont typeface="+mj-lt"/>
+              <a:buAutoNum type="arabicPeriod"/>
+            </a:pPr>
+            <a:endParaRPr lang="en-US" dirty="0"/>
+          </a:p>
+        </p:txBody>
+      </p:sp>
+    </p:spTree>
+    <p:extLst>
+      <p:ext uri="{BB962C8B-B14F-4D97-AF65-F5344CB8AC3E}">
+        <p14:creationId xmlns:p14="http://schemas.microsoft.com/office/powerpoint/2010/main" val="1409436407"/>
+      </p:ext>
+    </p:extLst>
+  </p:cSld>
+  <p:clrMapOvr>
+    <a:masterClrMapping/>
+  </p:clrMapOvr>
+</p:sld>
+</file>
+
+<file path=ppt/slides/slide3.xml><?xml version="1.0" encoding="utf-8"?>
+<p:sld xmlns:a="http://schemas.openxmlformats.org/drawingml/2006/main" xmlns:r="http://schemas.openxmlformats.org/officeDocument/2006/relationships" xmlns:p="http://schemas.openxmlformats.org/presentationml/2006/main">
+  <p:cSld>
+    <p:spTree>
+      <p:nvGrpSpPr>
+        <p:cNvPr id="1" name=""/>
+        <p:cNvGrpSpPr/>
+        <p:nvPr/>
+      </p:nvGrpSpPr>
+      <p:grpSpPr>
+        <a:xfrm>
+          <a:off x="0" y="0"/>
+          <a:ext cx="0" cy="0"/>
+          <a:chOff x="0" y="0"/>
+          <a:chExt cx="0" cy="0"/>
+        </a:xfrm>
+      </p:grpSpPr>
+      <p:sp>
+        <p:nvSpPr>
+          <p:cNvPr id="4" name="TextBox 3">
+            <a:extLst>
+              <a:ext uri="{FF2B5EF4-FFF2-40B4-BE49-F238E27FC236}">
+                <a16:creationId xmlns:a16="http://schemas.microsoft.com/office/drawing/2014/main" id="{B13FF52D-29EB-4115-9A3B-7840FC0DFFB1}"/>
+              </a:ext>
+            </a:extLst>
+          </p:cNvPr>
+          <p:cNvSpPr txBox="1"/>
+          <p:nvPr/>
+        </p:nvSpPr>
+        <p:spPr>
+          <a:xfrm>
+            <a:off x="494271" y="2207742"/>
+            <a:ext cx="8647926" cy="2246769"/>
+          </a:xfrm>
+          <a:prstGeom prst="rect">
+            <a:avLst/>
+          </a:prstGeom>
+          <a:noFill/>
+        </p:spPr>
+        <p:txBody>
+          <a:bodyPr wrap="square" rtlCol="0">
+            <a:spAutoFit/>
+          </a:bodyPr>
+          <a:lstStyle/>
+          <a:p>
+            <a:r>
+              <a:rPr lang="en-US" sz="2800" dirty="0"/>
+              <a:t>“And you have to realize that there are not very many things that have aged as well as the scheduler. Which is just another proof that scheduling is easy.”</a:t>
+            </a:r>
+          </a:p>
+          <a:p>
+            <a:r>
+              <a:rPr lang="en-US" sz="2800" dirty="0"/>
+              <a:t>Linus Torvalds, 2001 [2]</a:t>
+            </a:r>
+          </a:p>
+          <a:p>
+            <a:endParaRPr lang="en-US" sz="2800" dirty="0"/>
+          </a:p>
+        </p:txBody>
+      </p:sp>
+    </p:spTree>
+    <p:extLst>
+      <p:ext uri="{BB962C8B-B14F-4D97-AF65-F5344CB8AC3E}">
+        <p14:creationId xmlns:p14="http://schemas.microsoft.com/office/powerpoint/2010/main" val="3998777308"/>
+      </p:ext>
+    </p:extLst>
+  </p:cSld>
+  <p:clrMapOvr>
+    <a:masterClrMapping/>
+  </p:clrMapOvr>
+</p:sld>
+</file>
+
+<file path=ppt/slides/slide4.xml><?xml version="1.0" encoding="utf-8"?>
+<p:sld xmlns:a="http://schemas.openxmlformats.org/drawingml/2006/main" xmlns:r="http://schemas.openxmlformats.org/officeDocument/2006/relationships" xmlns:p="http://schemas.openxmlformats.org/presentationml/2006/main">
+  <p:cSld>
+    <p:spTree>
+      <p:nvGrpSpPr>
+        <p:cNvPr id="1" name=""/>
+        <p:cNvGrpSpPr/>
+        <p:nvPr/>
+      </p:nvGrpSpPr>
+      <p:grpSpPr>
+        <a:xfrm>
+          <a:off x="0" y="0"/>
+          <a:ext cx="0" cy="0"/>
+          <a:chOff x="0" y="0"/>
+          <a:chExt cx="0" cy="0"/>
+        </a:xfrm>
+      </p:grpSpPr>
+      <p:sp>
+        <p:nvSpPr>
+          <p:cNvPr id="2" name="Title 1">
+            <a:extLst>
+              <a:ext uri="{FF2B5EF4-FFF2-40B4-BE49-F238E27FC236}">
+                <a16:creationId xmlns:a16="http://schemas.microsoft.com/office/drawing/2014/main" id="{DCF92C05-1C98-453A-93C4-50D0A0132DD8}"/>
+              </a:ext>
+            </a:extLst>
+          </p:cNvPr>
+          <p:cNvSpPr>
+            <a:spLocks noGrp="1"/>
+          </p:cNvSpPr>
+          <p:nvPr>
+            <p:ph type="title"/>
+          </p:nvPr>
+        </p:nvSpPr>
+        <p:spPr/>
+        <p:txBody>
+          <a:bodyPr/>
+          <a:lstStyle/>
+          <a:p>
+            <a:r>
+              <a:rPr lang="en-US" dirty="0"/>
+              <a:t>Overview</a:t>
+            </a:r>
+          </a:p>
+        </p:txBody>
+      </p:sp>
+      <p:sp>
+        <p:nvSpPr>
+          <p:cNvPr id="3" name="Content Placeholder 2">
+            <a:extLst>
+              <a:ext uri="{FF2B5EF4-FFF2-40B4-BE49-F238E27FC236}">
+                <a16:creationId xmlns:a16="http://schemas.microsoft.com/office/drawing/2014/main" id="{17803503-BB9B-4A29-AEA2-68B073ED6A74}"/>
+              </a:ext>
+            </a:extLst>
+          </p:cNvPr>
+          <p:cNvSpPr>
+            <a:spLocks noGrp="1"/>
+          </p:cNvSpPr>
+          <p:nvPr>
+            <p:ph idx="1"/>
+          </p:nvPr>
+        </p:nvSpPr>
+        <p:spPr/>
+        <p:txBody>
+          <a:bodyPr/>
+          <a:lstStyle/>
+          <a:p>
+            <a:r>
+              <a:rPr lang="en-US" dirty="0"/>
+              <a:t>Establish needed concepts</a:t>
+            </a:r>
+          </a:p>
+          <a:p>
+            <a:r>
+              <a:rPr lang="en-US" dirty="0"/>
+              <a:t>Thread scheduling and thread load-balancing on Linux</a:t>
+            </a:r>
+          </a:p>
+          <a:p>
+            <a:r>
+              <a:rPr lang="en-US" dirty="0"/>
+              <a:t>Bug fixes and two new developments to the Linux thread scheduler</a:t>
+            </a:r>
+          </a:p>
+        </p:txBody>
+      </p:sp>
+    </p:spTree>
+    <p:extLst>
+      <p:ext uri="{BB962C8B-B14F-4D97-AF65-F5344CB8AC3E}">
+        <p14:creationId xmlns:p14="http://schemas.microsoft.com/office/powerpoint/2010/main" val="878520349"/>
+      </p:ext>
+    </p:extLst>
+  </p:cSld>
+  <p:clrMapOvr>
+    <a:masterClrMapping/>
+  </p:clrMapOvr>
+</p:sld>
+</file>
+
+<file path=ppt/slides/slide5.xml><?xml version="1.0" encoding="utf-8"?>
+<p:sld xmlns:a="http://schemas.openxmlformats.org/drawingml/2006/main" xmlns:r="http://schemas.openxmlformats.org/officeDocument/2006/relationships" xmlns:p="http://schemas.openxmlformats.org/presentationml/2006/main">
+  <p:cSld>
+    <p:spTree>
+      <p:nvGrpSpPr>
+        <p:cNvPr id="1" name=""/>
+        <p:cNvGrpSpPr/>
+        <p:nvPr/>
+      </p:nvGrpSpPr>
+      <p:grpSpPr>
+        <a:xfrm>
+          <a:off x="0" y="0"/>
+          <a:ext cx="0" cy="0"/>
+          <a:chOff x="0" y="0"/>
+          <a:chExt cx="0" cy="0"/>
+        </a:xfrm>
+      </p:grpSpPr>
+      <p:sp>
+        <p:nvSpPr>
+          <p:cNvPr id="3" name="Content Placeholder 2">
+            <a:extLst>
+              <a:ext uri="{FF2B5EF4-FFF2-40B4-BE49-F238E27FC236}">
+                <a16:creationId xmlns:a16="http://schemas.microsoft.com/office/drawing/2014/main" id="{B1E340F2-4789-4967-952F-9B21CF8303CD}"/>
+              </a:ext>
+            </a:extLst>
+          </p:cNvPr>
+          <p:cNvSpPr>
+            <a:spLocks noGrp="1"/>
+          </p:cNvSpPr>
+          <p:nvPr>
+            <p:ph idx="1"/>
+          </p:nvPr>
+        </p:nvSpPr>
+        <p:spPr>
+          <a:xfrm>
+            <a:off x="727027" y="2345636"/>
+            <a:ext cx="6558353" cy="2047461"/>
+          </a:xfrm>
+        </p:spPr>
+        <p:txBody>
+          <a:bodyPr>
+            <a:normAutofit/>
+          </a:bodyPr>
+          <a:lstStyle/>
+          <a:p>
+            <a:pPr marL="0" indent="0">
+              <a:buNone/>
+            </a:pPr>
+            <a:r>
+              <a:rPr lang="en-US" sz="2400" dirty="0"/>
+              <a:t>Before we define what thread scheduling is,</a:t>
+            </a:r>
+          </a:p>
+          <a:p>
+            <a:pPr marL="0" indent="0">
+              <a:buNone/>
+            </a:pPr>
+            <a:r>
+              <a:rPr lang="en-US" sz="2400" dirty="0"/>
+              <a:t>let’s get some terms out of the way!</a:t>
+            </a:r>
+          </a:p>
+        </p:txBody>
+      </p:sp>
+    </p:spTree>
+    <p:extLst>
+      <p:ext uri="{BB962C8B-B14F-4D97-AF65-F5344CB8AC3E}">
+        <p14:creationId xmlns:p14="http://schemas.microsoft.com/office/powerpoint/2010/main" val="2869639970"/>
+      </p:ext>
+    </p:extLst>
+  </p:cSld>
+  <p:clrMapOvr>
+    <a:masterClrMapping/>
+  </p:clrMapOvr>
+</p:sld>
+</file>
+
+<file path=ppt/slides/slide6.xml><?xml version="1.0" encoding="utf-8"?>
+<p:sld xmlns:a="http://schemas.openxmlformats.org/drawingml/2006/main" xmlns:r="http://schemas.openxmlformats.org/officeDocument/2006/relationships" xmlns:p="http://schemas.openxmlformats.org/presentationml/2006/main">
+  <p:cSld>
+    <p:spTree>
+      <p:nvGrpSpPr>
+        <p:cNvPr id="1" name=""/>
+        <p:cNvGrpSpPr/>
+        <p:nvPr/>
+      </p:nvGrpSpPr>
+      <p:grpSpPr>
+        <a:xfrm>
+          <a:off x="0" y="0"/>
+          <a:ext cx="0" cy="0"/>
+          <a:chOff x="0" y="0"/>
+          <a:chExt cx="0" cy="0"/>
+        </a:xfrm>
+      </p:grpSpPr>
+      <p:sp>
+        <p:nvSpPr>
+          <p:cNvPr id="2" name="Title 1">
+            <a:extLst>
+              <a:ext uri="{FF2B5EF4-FFF2-40B4-BE49-F238E27FC236}">
+                <a16:creationId xmlns:a16="http://schemas.microsoft.com/office/drawing/2014/main" id="{BDD0509A-6666-45C3-8F03-D2600104FFEE}"/>
+              </a:ext>
+            </a:extLst>
+          </p:cNvPr>
+          <p:cNvSpPr>
+            <a:spLocks noGrp="1"/>
+          </p:cNvSpPr>
+          <p:nvPr>
+            <p:ph type="title"/>
+          </p:nvPr>
+        </p:nvSpPr>
+        <p:spPr/>
+        <p:txBody>
+          <a:bodyPr/>
+          <a:lstStyle/>
+          <a:p>
+            <a:r>
+              <a:rPr lang="en-US" dirty="0"/>
+              <a:t>Outline</a:t>
+            </a:r>
+          </a:p>
+        </p:txBody>
+      </p:sp>
+      <p:sp>
+        <p:nvSpPr>
+          <p:cNvPr id="3" name="Content Placeholder 2">
+            <a:extLst>
+              <a:ext uri="{FF2B5EF4-FFF2-40B4-BE49-F238E27FC236}">
+                <a16:creationId xmlns:a16="http://schemas.microsoft.com/office/drawing/2014/main" id="{5D73516D-08C5-41D9-94BA-396221B63085}"/>
+              </a:ext>
+            </a:extLst>
+          </p:cNvPr>
+          <p:cNvSpPr>
+            <a:spLocks noGrp="1"/>
+          </p:cNvSpPr>
+          <p:nvPr>
+            <p:ph idx="1"/>
+          </p:nvPr>
+        </p:nvSpPr>
+        <p:spPr/>
+        <p:txBody>
+          <a:bodyPr/>
+          <a:lstStyle/>
+          <a:p>
+            <a:r>
+              <a:rPr lang="en-US" dirty="0"/>
+              <a:t>Establish needed concepts</a:t>
+            </a:r>
+          </a:p>
+          <a:p>
+            <a:pPr lvl="1"/>
+            <a:r>
+              <a:rPr lang="en-US" dirty="0"/>
+              <a:t>Threads, Multithreading Programs</a:t>
+            </a:r>
+          </a:p>
+          <a:p>
+            <a:pPr lvl="1"/>
+            <a:r>
+              <a:rPr lang="en-US" dirty="0"/>
+              <a:t>Parallel programming</a:t>
+            </a:r>
+          </a:p>
+          <a:p>
+            <a:pPr lvl="1"/>
+            <a:r>
+              <a:rPr lang="en-US" dirty="0"/>
+              <a:t>Synchronicity and Locks</a:t>
+            </a:r>
+          </a:p>
+          <a:p>
+            <a:r>
+              <a:rPr lang="en-US" dirty="0">
+                <a:solidFill>
+                  <a:schemeClr val="accent1">
+                    <a:lumMod val="75000"/>
+                  </a:schemeClr>
+                </a:solidFill>
+              </a:rPr>
+              <a:t>Thread scheduling and thread load-balancing on Linux</a:t>
+            </a:r>
+          </a:p>
+          <a:p>
+            <a:r>
+              <a:rPr lang="en-US" dirty="0">
+                <a:solidFill>
+                  <a:schemeClr val="accent1">
+                    <a:lumMod val="75000"/>
+                  </a:schemeClr>
+                </a:solidFill>
+              </a:rPr>
+              <a:t>Bug fixes and two new developments to the Linux thread scheduler</a:t>
+            </a:r>
+          </a:p>
+          <a:p>
+            <a:pPr lvl="1"/>
+            <a:endParaRPr lang="en-US" dirty="0"/>
+          </a:p>
+          <a:p>
+            <a:pPr lvl="2"/>
+            <a:endParaRPr lang="en-US" dirty="0"/>
+          </a:p>
+        </p:txBody>
+      </p:sp>
+    </p:spTree>
+    <p:extLst>
+      <p:ext uri="{BB962C8B-B14F-4D97-AF65-F5344CB8AC3E}">
+        <p14:creationId xmlns:p14="http://schemas.microsoft.com/office/powerpoint/2010/main" val="1957347650"/>
+      </p:ext>
+    </p:extLst>
+  </p:cSld>
+  <p:clrMapOvr>
+    <a:masterClrMapping/>
+  </p:clrMapOvr>
+</p:sld>
+</file>
+
+<file path=ppt/slides/slide7.xml><?xml version="1.0" encoding="utf-8"?>
+<p:sld xmlns:a="http://schemas.openxmlformats.org/drawingml/2006/main" xmlns:r="http://schemas.openxmlformats.org/officeDocument/2006/relationships" xmlns:p="http://schemas.openxmlformats.org/presentationml/2006/main">
+  <p:cSld>
+    <p:bg>
+      <p:bgPr>
+        <a:solidFill>
+          <a:schemeClr val="bg2"/>
+        </a:solidFill>
+        <a:effectLst/>
+      </p:bgPr>
+    </p:bg>
+    <p:spTree>
+      <p:nvGrpSpPr>
+        <p:cNvPr id="1" name=""/>
+        <p:cNvGrpSpPr/>
+        <p:nvPr/>
+      </p:nvGrpSpPr>
+      <p:grpSpPr>
+        <a:xfrm>
+          <a:off x="0" y="0"/>
+          <a:ext cx="0" cy="0"/>
+          <a:chOff x="0" y="0"/>
+          <a:chExt cx="0" cy="0"/>
+        </a:xfrm>
+      </p:grpSpPr>
+      <p:pic>
+        <p:nvPicPr>
+          <p:cNvPr id="11" name="Picture 10">
+            <a:extLst>
+              <a:ext uri="{FF2B5EF4-FFF2-40B4-BE49-F238E27FC236}">
+                <a16:creationId xmlns:a16="http://schemas.microsoft.com/office/drawing/2014/main" id="{419D46DA-3F9A-47BF-A34F-F26DB99740B7}"/>
+              </a:ext>
+            </a:extLst>
+          </p:cNvPr>
+          <p:cNvPicPr>
+            <a:picLocks noChangeAspect="1"/>
+          </p:cNvPicPr>
+          <p:nvPr/>
+        </p:nvPicPr>
+        <p:blipFill>
+          <a:blip r:embed="rId2">
+            <a:extLst>
+              <a:ext uri="{96DAC541-7B7A-43D3-8B79-37D633B846F1}">
+                <asvg:svgBlip xmlns:asvg="http://schemas.microsoft.com/office/drawing/2016/SVG/main" r:embed="rId3"/>
+              </a:ext>
+            </a:extLst>
+          </a:blip>
+          <a:stretch>
+            <a:fillRect/>
+          </a:stretch>
+        </p:blipFill>
+        <p:spPr>
+          <a:xfrm>
+            <a:off x="5030394" y="896708"/>
+            <a:ext cx="4585524" cy="4560049"/>
+          </a:xfrm>
+          <a:prstGeom prst="rect">
+            <a:avLst/>
+          </a:prstGeom>
+        </p:spPr>
+      </p:pic>
+      <p:sp>
+        <p:nvSpPr>
+          <p:cNvPr id="3" name="Content Placeholder 2">
+            <a:extLst>
+              <a:ext uri="{FF2B5EF4-FFF2-40B4-BE49-F238E27FC236}">
+                <a16:creationId xmlns:a16="http://schemas.microsoft.com/office/drawing/2014/main" id="{D83E9CED-5A39-49BF-9563-8FD5937C2082}"/>
+              </a:ext>
+            </a:extLst>
+          </p:cNvPr>
+          <p:cNvSpPr>
+            <a:spLocks noGrp="1"/>
+          </p:cNvSpPr>
+          <p:nvPr>
+            <p:ph idx="1"/>
+          </p:nvPr>
+        </p:nvSpPr>
+        <p:spPr>
+          <a:xfrm>
+            <a:off x="586408" y="1242391"/>
+            <a:ext cx="3819414" cy="4919870"/>
+          </a:xfrm>
+        </p:spPr>
+        <p:txBody>
+          <a:bodyPr>
+            <a:normAutofit/>
+          </a:bodyPr>
+          <a:lstStyle/>
+          <a:p>
+            <a:r>
+              <a:rPr lang="en-US" dirty="0"/>
+              <a:t>Threads allow a program to run more than one independent task at one time</a:t>
+            </a:r>
+          </a:p>
+          <a:p>
+            <a:endParaRPr lang="en-US" dirty="0"/>
+          </a:p>
+          <a:p>
+            <a:r>
+              <a:rPr lang="en-US" dirty="0"/>
+              <a:t>Useful for…</a:t>
+            </a:r>
+          </a:p>
+          <a:p>
+            <a:pPr lvl="1"/>
+            <a:r>
+              <a:rPr lang="en-US" dirty="0"/>
+              <a:t>Programs with long, mostly-independent computations</a:t>
+            </a:r>
+          </a:p>
+          <a:p>
+            <a:pPr lvl="1"/>
+            <a:r>
+              <a:rPr lang="en-US" dirty="0"/>
+              <a:t>Programs with graphical interface</a:t>
+            </a:r>
+          </a:p>
+          <a:p>
+            <a:pPr marL="457200" lvl="1" indent="0">
+              <a:buNone/>
+            </a:pPr>
+            <a:endParaRPr lang="en-US" dirty="0"/>
+          </a:p>
+          <a:p>
+            <a:r>
+              <a:rPr lang="en-US" dirty="0"/>
+              <a:t>Example GUI Program (right)</a:t>
+            </a:r>
+          </a:p>
+          <a:p>
+            <a:pPr marL="457200" lvl="1" indent="0">
+              <a:buNone/>
+            </a:pPr>
+            <a:r>
+              <a:rPr lang="en-US" dirty="0"/>
+              <a:t>In this figure there are</a:t>
+            </a:r>
+            <a:br>
+              <a:rPr lang="en-US" dirty="0"/>
+            </a:br>
+            <a:r>
+              <a:rPr lang="en-US" dirty="0">
+                <a:solidFill>
+                  <a:schemeClr val="accent2">
+                    <a:lumMod val="60000"/>
+                    <a:lumOff val="40000"/>
+                  </a:schemeClr>
+                </a:solidFill>
+              </a:rPr>
+              <a:t>three</a:t>
+            </a:r>
+            <a:r>
+              <a:rPr lang="en-US" dirty="0"/>
+              <a:t> Threads created within</a:t>
+            </a:r>
+            <a:br>
+              <a:rPr lang="en-US" dirty="0"/>
+            </a:br>
+            <a:r>
+              <a:rPr lang="en-US" dirty="0">
+                <a:solidFill>
+                  <a:schemeClr val="accent2">
+                    <a:lumMod val="60000"/>
+                    <a:lumOff val="40000"/>
+                  </a:schemeClr>
+                </a:solidFill>
+              </a:rPr>
+              <a:t>one</a:t>
+            </a:r>
+            <a:r>
+              <a:rPr lang="en-US" dirty="0"/>
+              <a:t> Process</a:t>
+            </a:r>
+          </a:p>
+        </p:txBody>
+      </p:sp>
+      <p:sp>
+        <p:nvSpPr>
+          <p:cNvPr id="15" name="Title 14">
+            <a:extLst>
+              <a:ext uri="{FF2B5EF4-FFF2-40B4-BE49-F238E27FC236}">
+                <a16:creationId xmlns:a16="http://schemas.microsoft.com/office/drawing/2014/main" id="{DD5971B8-AEDF-4A4F-A785-3ABA81D954C9}"/>
+              </a:ext>
+            </a:extLst>
+          </p:cNvPr>
+          <p:cNvSpPr>
+            <a:spLocks noGrp="1"/>
+          </p:cNvSpPr>
+          <p:nvPr>
+            <p:ph type="title"/>
+          </p:nvPr>
+        </p:nvSpPr>
+        <p:spPr>
+          <a:xfrm>
+            <a:off x="677334" y="609600"/>
+            <a:ext cx="3728488" cy="632791"/>
+          </a:xfrm>
+        </p:spPr>
+        <p:txBody>
+          <a:bodyPr>
+            <a:normAutofit fontScale="90000"/>
+          </a:bodyPr>
+          <a:lstStyle/>
+          <a:p>
+            <a:r>
+              <a:rPr lang="en-US" dirty="0"/>
+              <a:t>Using Threads</a:t>
+            </a:r>
+          </a:p>
+        </p:txBody>
+      </p:sp>
+    </p:spTree>
+    <p:extLst>
+      <p:ext uri="{BB962C8B-B14F-4D97-AF65-F5344CB8AC3E}">
+        <p14:creationId xmlns:p14="http://schemas.microsoft.com/office/powerpoint/2010/main" val="3896337394"/>
+      </p:ext>
+    </p:extLst>
+  </p:cSld>
+  <p:clrMapOvr>
+    <a:masterClrMapping/>
+  </p:clrMapOvr>
+</p:sld>
+</file>
+
+<file path=ppt/slides/slide8.xml><?xml version="1.0" encoding="utf-8"?>
+<p:sld xmlns:a="http://schemas.openxmlformats.org/drawingml/2006/main" xmlns:r="http://schemas.openxmlformats.org/officeDocument/2006/relationships" xmlns:p="http://schemas.openxmlformats.org/presentationml/2006/main">
+  <p:cSld>
+    <p:bg>
+      <p:bgPr>
+        <a:solidFill>
+          <a:schemeClr val="bg2"/>
+        </a:solidFill>
+        <a:effectLst/>
+      </p:bgPr>
+    </p:bg>
+    <p:spTree>
+      <p:nvGrpSpPr>
+        <p:cNvPr id="1" name=""/>
+        <p:cNvGrpSpPr/>
+        <p:nvPr/>
+      </p:nvGrpSpPr>
+      <p:grpSpPr>
+        <a:xfrm>
+          <a:off x="0" y="0"/>
+          <a:ext cx="0" cy="0"/>
+          <a:chOff x="0" y="0"/>
+          <a:chExt cx="0" cy="0"/>
+        </a:xfrm>
+      </p:grpSpPr>
+      <p:sp>
+        <p:nvSpPr>
+          <p:cNvPr id="3" name="Content Placeholder 2">
+            <a:extLst>
+              <a:ext uri="{FF2B5EF4-FFF2-40B4-BE49-F238E27FC236}">
+                <a16:creationId xmlns:a16="http://schemas.microsoft.com/office/drawing/2014/main" id="{D83E9CED-5A39-49BF-9563-8FD5937C2082}"/>
+              </a:ext>
+            </a:extLst>
+          </p:cNvPr>
+          <p:cNvSpPr>
+            <a:spLocks noGrp="1"/>
+          </p:cNvSpPr>
+          <p:nvPr>
+            <p:ph idx="1"/>
+          </p:nvPr>
+        </p:nvSpPr>
+        <p:spPr>
+          <a:xfrm>
+            <a:off x="592114" y="1242391"/>
+            <a:ext cx="8661216" cy="4591877"/>
+          </a:xfrm>
+        </p:spPr>
+        <p:txBody>
+          <a:bodyPr>
+            <a:normAutofit/>
+          </a:bodyPr>
+          <a:lstStyle/>
+          <a:p>
+            <a:r>
+              <a:rPr lang="en-US" dirty="0"/>
+              <a:t>A </a:t>
+            </a:r>
+            <a:r>
+              <a:rPr lang="en-US" dirty="0">
+                <a:solidFill>
+                  <a:schemeClr val="accent2">
+                    <a:lumMod val="60000"/>
+                    <a:lumOff val="40000"/>
+                  </a:schemeClr>
+                </a:solidFill>
+              </a:rPr>
+              <a:t>multithreaded program </a:t>
+            </a:r>
+            <a:r>
+              <a:rPr lang="en-US" dirty="0"/>
+              <a:t>is a program that employs threads</a:t>
+            </a:r>
+          </a:p>
+          <a:p>
+            <a:endParaRPr lang="en-US" dirty="0"/>
+          </a:p>
+          <a:p>
+            <a:r>
+              <a:rPr lang="en-US" dirty="0">
+                <a:solidFill>
+                  <a:schemeClr val="accent2">
+                    <a:lumMod val="60000"/>
+                    <a:lumOff val="40000"/>
+                  </a:schemeClr>
+                </a:solidFill>
+              </a:rPr>
+              <a:t>Concurrent computing </a:t>
+            </a:r>
+            <a:r>
+              <a:rPr lang="en-US" dirty="0"/>
+              <a:t>techniques are techniques that allow many tasks to occur at the same time [W]</a:t>
+            </a:r>
+          </a:p>
+          <a:p>
+            <a:endParaRPr lang="en-US" dirty="0"/>
+          </a:p>
+          <a:p>
+            <a:r>
+              <a:rPr lang="en-US" dirty="0">
+                <a:solidFill>
+                  <a:schemeClr val="accent2">
+                    <a:lumMod val="60000"/>
+                    <a:lumOff val="40000"/>
+                  </a:schemeClr>
+                </a:solidFill>
+              </a:rPr>
+              <a:t>Parallel computing </a:t>
+            </a:r>
+            <a:r>
+              <a:rPr lang="en-US" dirty="0"/>
+              <a:t>techniques are techniques that allow many calculations to occur at the same time [W]</a:t>
+            </a:r>
+          </a:p>
+          <a:p>
+            <a:pPr marL="0" indent="0">
+              <a:buNone/>
+            </a:pPr>
+            <a:endParaRPr lang="en-US" dirty="0"/>
+          </a:p>
+          <a:p>
+            <a:r>
+              <a:rPr lang="en-US" dirty="0"/>
+              <a:t>Problems can be solved or improved using none, either or </a:t>
+            </a:r>
+            <a:r>
+              <a:rPr lang="en-US" dirty="0">
+                <a:solidFill>
+                  <a:schemeClr val="tx1"/>
+                </a:solidFill>
+              </a:rPr>
+              <a:t>both</a:t>
+            </a:r>
+            <a:r>
+              <a:rPr lang="en-US" dirty="0"/>
+              <a:t> of these techniques at once</a:t>
+            </a:r>
+          </a:p>
+        </p:txBody>
+      </p:sp>
+      <p:sp>
+        <p:nvSpPr>
+          <p:cNvPr id="15" name="Title 14">
+            <a:extLst>
+              <a:ext uri="{FF2B5EF4-FFF2-40B4-BE49-F238E27FC236}">
+                <a16:creationId xmlns:a16="http://schemas.microsoft.com/office/drawing/2014/main" id="{DD5971B8-AEDF-4A4F-A785-3ABA81D954C9}"/>
+              </a:ext>
+            </a:extLst>
+          </p:cNvPr>
+          <p:cNvSpPr>
+            <a:spLocks noGrp="1"/>
+          </p:cNvSpPr>
+          <p:nvPr>
+            <p:ph type="title"/>
+          </p:nvPr>
+        </p:nvSpPr>
+        <p:spPr>
+          <a:xfrm>
+            <a:off x="677334" y="609600"/>
+            <a:ext cx="3384712" cy="632791"/>
+          </a:xfrm>
+        </p:spPr>
+        <p:txBody>
+          <a:bodyPr>
+            <a:normAutofit fontScale="90000"/>
+          </a:bodyPr>
+          <a:lstStyle/>
+          <a:p>
+            <a:r>
+              <a:rPr lang="en-US" dirty="0"/>
+              <a:t>Using Threads</a:t>
+            </a:r>
+          </a:p>
+        </p:txBody>
+      </p:sp>
+    </p:spTree>
+    <p:extLst>
+      <p:ext uri="{BB962C8B-B14F-4D97-AF65-F5344CB8AC3E}">
+        <p14:creationId xmlns:p14="http://schemas.microsoft.com/office/powerpoint/2010/main" val="1603242835"/>
+      </p:ext>
+    </p:extLst>
+  </p:cSld>
+  <p:clrMapOvr>
+    <a:masterClrMapping/>
+  </p:clrMapOvr>
+</p:sld>
+</file>
+
+<file path=ppt/slides/slide9.xml><?xml version="1.0" encoding="utf-8"?>
+<p:sld xmlns:a="http://schemas.openxmlformats.org/drawingml/2006/main" xmlns:r="http://schemas.openxmlformats.org/officeDocument/2006/relationships" xmlns:p="http://schemas.openxmlformats.org/presentationml/2006/main">
+  <p:cSld>
+    <p:spTree>
+      <p:nvGrpSpPr>
+        <p:cNvPr id="1" name=""/>
+        <p:cNvGrpSpPr/>
+        <p:nvPr/>
+      </p:nvGrpSpPr>
+      <p:grpSpPr>
+        <a:xfrm>
+          <a:off x="0" y="0"/>
+          <a:ext cx="0" cy="0"/>
+          <a:chOff x="0" y="0"/>
+          <a:chExt cx="0" cy="0"/>
+        </a:xfrm>
+      </p:grpSpPr>
+      <p:sp>
+        <p:nvSpPr>
+          <p:cNvPr id="2" name="Title 1">
+            <a:extLst>
+              <a:ext uri="{FF2B5EF4-FFF2-40B4-BE49-F238E27FC236}">
+                <a16:creationId xmlns:a16="http://schemas.microsoft.com/office/drawing/2014/main" id="{5BDA6342-AA3A-46B0-ACBB-BB87A6998B4F}"/>
+              </a:ext>
+            </a:extLst>
+          </p:cNvPr>
+          <p:cNvSpPr>
+            <a:spLocks noGrp="1"/>
+          </p:cNvSpPr>
+          <p:nvPr>
+            <p:ph type="title"/>
+          </p:nvPr>
+        </p:nvSpPr>
+        <p:spPr/>
+        <p:txBody>
+          <a:bodyPr/>
+          <a:lstStyle/>
+          <a:p>
+            <a:r>
+              <a:rPr lang="en-US" dirty="0"/>
+              <a:t>Parallel Programming</a:t>
+            </a:r>
+          </a:p>
+        </p:txBody>
+      </p:sp>
+      <p:sp>
+        <p:nvSpPr>
+          <p:cNvPr id="3" name="Content Placeholder 2">
+            <a:extLst>
+              <a:ext uri="{FF2B5EF4-FFF2-40B4-BE49-F238E27FC236}">
+                <a16:creationId xmlns:a16="http://schemas.microsoft.com/office/drawing/2014/main" id="{709216B0-2E5D-4118-BAB1-5893F4583306}"/>
+              </a:ext>
+            </a:extLst>
+          </p:cNvPr>
+          <p:cNvSpPr>
+            <a:spLocks noGrp="1"/>
+          </p:cNvSpPr>
+          <p:nvPr>
+            <p:ph idx="1"/>
+          </p:nvPr>
+        </p:nvSpPr>
+        <p:spPr/>
+        <p:txBody>
+          <a:bodyPr/>
+          <a:lstStyle/>
+          <a:p>
+            <a:r>
+              <a:rPr lang="en-US" dirty="0"/>
+              <a:t>[Fill in once I actually know anything about parallel computing]</a:t>
+            </a:r>
+          </a:p>
+          <a:p>
+            <a:r>
+              <a:rPr lang="en-US" dirty="0"/>
+              <a:t>Don’t go in to detail, high level descriptions.</a:t>
+            </a:r>
+          </a:p>
+        </p:txBody>
+      </p:sp>
+    </p:spTree>
+    <p:extLst>
+      <p:ext uri="{BB962C8B-B14F-4D97-AF65-F5344CB8AC3E}">
+        <p14:creationId xmlns:p14="http://schemas.microsoft.com/office/powerpoint/2010/main" val="1004208049"/>
       </p:ext>
     </p:extLst>
   </p:cSld>

</xml_diff>

<commit_message>
Add transition to shuffler
</commit_message>
<xml_diff>
--- a/Talk/Thread Scheduler Efficiency Improvements.pptx
+++ b/Talk/Thread Scheduler Efficiency Improvements.pptx
@@ -36,9 +36,12 @@
     <p:sldId id="289" r:id="rId30"/>
     <p:sldId id="290" r:id="rId31"/>
     <p:sldId id="293" r:id="rId32"/>
-    <p:sldId id="276" r:id="rId33"/>
-    <p:sldId id="265" r:id="rId34"/>
-    <p:sldId id="261" r:id="rId35"/>
+    <p:sldId id="294" r:id="rId33"/>
+    <p:sldId id="276" r:id="rId34"/>
+    <p:sldId id="295" r:id="rId35"/>
+    <p:sldId id="296" r:id="rId36"/>
+    <p:sldId id="265" r:id="rId37"/>
+    <p:sldId id="261" r:id="rId38"/>
   </p:sldIdLst>
   <p:sldSz cx="12192000" cy="6858000"/>
   <p:notesSz cx="6858000" cy="9144000"/>
@@ -189,15 +192,19 @@
             <p14:sldId id="289"/>
             <p14:sldId id="290"/>
             <p14:sldId id="293"/>
+            <p14:sldId id="294"/>
           </p14:sldIdLst>
         </p14:section>
         <p14:section name="Shuffler" id="{1D1BDA72-031E-450A-B202-8386D7190F24}">
           <p14:sldIdLst>
             <p14:sldId id="276"/>
+            <p14:sldId id="295"/>
           </p14:sldIdLst>
         </p14:section>
         <p14:section name="FLSCHED" id="{F3678A86-281D-40AC-9C05-06E157C3E6A1}">
-          <p14:sldIdLst/>
+          <p14:sldIdLst>
+            <p14:sldId id="296"/>
+          </p14:sldIdLst>
         </p14:section>
         <p14:section name="End" id="{B473DF66-401F-4834-8DCF-1D1709FABAC9}">
           <p14:sldIdLst>
@@ -943,7 +950,7 @@
             <a:fld id="{B61BEF0D-F0BB-DE4B-95CE-6DB70DBA9567}" type="datetimeFigureOut">
               <a:rPr lang="en-US" dirty="0"/>
               <a:pPr/>
-              <a:t>11/12/2017</a:t>
+              <a:t>11/13/2017</a:t>
             </a:fld>
             <a:endParaRPr lang="en-US" dirty="0"/>
           </a:p>
@@ -1191,7 +1198,7 @@
             <a:fld id="{B61BEF0D-F0BB-DE4B-95CE-6DB70DBA9567}" type="datetimeFigureOut">
               <a:rPr lang="en-US" dirty="0"/>
               <a:pPr/>
-              <a:t>11/12/2017</a:t>
+              <a:t>11/13/2017</a:t>
             </a:fld>
             <a:endParaRPr lang="en-US" dirty="0"/>
           </a:p>
@@ -1502,7 +1509,7 @@
             <a:fld id="{B61BEF0D-F0BB-DE4B-95CE-6DB70DBA9567}" type="datetimeFigureOut">
               <a:rPr lang="en-US" dirty="0"/>
               <a:pPr/>
-              <a:t>11/12/2017</a:t>
+              <a:t>11/13/2017</a:t>
             </a:fld>
             <a:endParaRPr lang="en-US" dirty="0"/>
           </a:p>
@@ -1826,7 +1833,7 @@
             <a:fld id="{B61BEF0D-F0BB-DE4B-95CE-6DB70DBA9567}" type="datetimeFigureOut">
               <a:rPr lang="en-US" dirty="0"/>
               <a:pPr/>
-              <a:t>11/12/2017</a:t>
+              <a:t>11/13/2017</a:t>
             </a:fld>
             <a:endParaRPr lang="en-US" dirty="0"/>
           </a:p>
@@ -2137,7 +2144,7 @@
             <a:fld id="{B61BEF0D-F0BB-DE4B-95CE-6DB70DBA9567}" type="datetimeFigureOut">
               <a:rPr lang="en-US" dirty="0"/>
               <a:pPr/>
-              <a:t>11/12/2017</a:t>
+              <a:t>11/13/2017</a:t>
             </a:fld>
             <a:endParaRPr lang="en-US" dirty="0"/>
           </a:p>
@@ -2521,7 +2528,7 @@
             <a:fld id="{B61BEF0D-F0BB-DE4B-95CE-6DB70DBA9567}" type="datetimeFigureOut">
               <a:rPr lang="en-US" dirty="0"/>
               <a:pPr/>
-              <a:t>11/12/2017</a:t>
+              <a:t>11/13/2017</a:t>
             </a:fld>
             <a:endParaRPr lang="en-US" dirty="0"/>
           </a:p>
@@ -2687,7 +2694,7 @@
           <a:p>
             <a:fld id="{55C6B4A9-1611-4792-9094-5F34BCA07E0B}" type="datetimeFigureOut">
               <a:rPr lang="en-US" dirty="0"/>
-              <a:t>11/12/2017</a:t>
+              <a:t>11/13/2017</a:t>
             </a:fld>
             <a:endParaRPr lang="en-US" dirty="0"/>
           </a:p>
@@ -2863,7 +2870,7 @@
             <a:fld id="{B61BEF0D-F0BB-DE4B-95CE-6DB70DBA9567}" type="datetimeFigureOut">
               <a:rPr lang="en-US" dirty="0"/>
               <a:pPr/>
-              <a:t>11/12/2017</a:t>
+              <a:t>11/13/2017</a:t>
             </a:fld>
             <a:endParaRPr lang="en-US" dirty="0"/>
           </a:p>
@@ -3036,7 +3043,7 @@
             <a:fld id="{B61BEF0D-F0BB-DE4B-95CE-6DB70DBA9567}" type="datetimeFigureOut">
               <a:rPr lang="en-US" dirty="0"/>
               <a:pPr/>
-              <a:t>11/12/2017</a:t>
+              <a:t>11/13/2017</a:t>
             </a:fld>
             <a:endParaRPr lang="en-US" dirty="0"/>
           </a:p>
@@ -3280,7 +3287,7 @@
             <a:fld id="{B61BEF0D-F0BB-DE4B-95CE-6DB70DBA9567}" type="datetimeFigureOut">
               <a:rPr lang="en-US" dirty="0"/>
               <a:pPr/>
-              <a:t>11/12/2017</a:t>
+              <a:t>11/13/2017</a:t>
             </a:fld>
             <a:endParaRPr lang="en-US" dirty="0"/>
           </a:p>
@@ -3508,7 +3515,7 @@
           <a:p>
             <a:fld id="{EB712588-04B1-427B-82EE-E8DB90309F08}" type="datetimeFigureOut">
               <a:rPr lang="en-US" dirty="0"/>
-              <a:t>11/12/2017</a:t>
+              <a:t>11/13/2017</a:t>
             </a:fld>
             <a:endParaRPr lang="en-US" dirty="0"/>
           </a:p>
@@ -3878,7 +3885,7 @@
             <a:fld id="{B61BEF0D-F0BB-DE4B-95CE-6DB70DBA9567}" type="datetimeFigureOut">
               <a:rPr lang="en-US" dirty="0"/>
               <a:pPr/>
-              <a:t>11/12/2017</a:t>
+              <a:t>11/13/2017</a:t>
             </a:fld>
             <a:endParaRPr lang="en-US" dirty="0"/>
           </a:p>
@@ -3998,7 +4005,7 @@
             <a:fld id="{B61BEF0D-F0BB-DE4B-95CE-6DB70DBA9567}" type="datetimeFigureOut">
               <a:rPr lang="en-US" dirty="0"/>
               <a:pPr/>
-              <a:t>11/12/2017</a:t>
+              <a:t>11/13/2017</a:t>
             </a:fld>
             <a:endParaRPr lang="en-US" dirty="0"/>
           </a:p>
@@ -4090,7 +4097,7 @@
             <a:fld id="{B61BEF0D-F0BB-DE4B-95CE-6DB70DBA9567}" type="datetimeFigureOut">
               <a:rPr lang="en-US" dirty="0"/>
               <a:pPr/>
-              <a:t>11/12/2017</a:t>
+              <a:t>11/13/2017</a:t>
             </a:fld>
             <a:endParaRPr lang="en-US" dirty="0"/>
           </a:p>
@@ -4341,7 +4348,7 @@
           <a:p>
             <a:fld id="{42A54C80-263E-416B-A8E0-580EDEADCBDC}" type="datetimeFigureOut">
               <a:rPr lang="en-US" dirty="0"/>
-              <a:t>11/12/2017</a:t>
+              <a:t>11/13/2017</a:t>
             </a:fld>
             <a:endParaRPr lang="en-US" dirty="0"/>
           </a:p>
@@ -4600,7 +4607,7 @@
             <a:fld id="{B61BEF0D-F0BB-DE4B-95CE-6DB70DBA9567}" type="datetimeFigureOut">
               <a:rPr lang="en-US" dirty="0"/>
               <a:pPr/>
-              <a:t>11/12/2017</a:t>
+              <a:t>11/13/2017</a:t>
             </a:fld>
             <a:endParaRPr lang="en-US" dirty="0"/>
           </a:p>
@@ -5342,7 +5349,7 @@
             <a:fld id="{B61BEF0D-F0BB-DE4B-95CE-6DB70DBA9567}" type="datetimeFigureOut">
               <a:rPr lang="en-US" dirty="0"/>
               <a:pPr/>
-              <a:t>11/12/2017</a:t>
+              <a:t>11/13/2017</a:t>
             </a:fld>
             <a:endParaRPr lang="en-US" dirty="0"/>
           </a:p>
@@ -12755,7 +12762,7 @@
           <p:cNvPr id="3" name="Content Placeholder 2">
             <a:extLst>
               <a:ext uri="{FF2B5EF4-FFF2-40B4-BE49-F238E27FC236}">
-                <a16:creationId xmlns:a16="http://schemas.microsoft.com/office/drawing/2014/main" id="{D83E9CED-5A39-49BF-9563-8FD5937C2082}"/>
+                <a16:creationId xmlns:a16="http://schemas.microsoft.com/office/drawing/2014/main" id="{CCDDCECE-BD79-4B3B-8B73-C93E13BEEEE2}"/>
               </a:ext>
             </a:extLst>
           </p:cNvPr>
@@ -12766,53 +12773,83 @@
             <p:ph idx="1"/>
           </p:nvPr>
         </p:nvSpPr>
-        <p:spPr>
-          <a:xfrm>
-            <a:off x="592114" y="1242391"/>
-            <a:ext cx="8661216" cy="4591877"/>
-          </a:xfrm>
-        </p:spPr>
+        <p:spPr/>
         <p:txBody>
           <a:bodyPr>
             <a:normAutofit/>
           </a:bodyPr>
           <a:lstStyle/>
           <a:p>
-            <a:endParaRPr lang="en-US" dirty="0"/>
-          </a:p>
-        </p:txBody>
-      </p:sp>
-      <p:sp>
-        <p:nvSpPr>
-          <p:cNvPr id="15" name="Title 14">
-            <a:extLst>
-              <a:ext uri="{FF2B5EF4-FFF2-40B4-BE49-F238E27FC236}">
-                <a16:creationId xmlns:a16="http://schemas.microsoft.com/office/drawing/2014/main" id="{DD5971B8-AEDF-4A4F-A785-3ABA81D954C9}"/>
-              </a:ext>
-            </a:extLst>
-          </p:cNvPr>
-          <p:cNvSpPr>
-            <a:spLocks noGrp="1"/>
-          </p:cNvSpPr>
-          <p:nvPr>
-            <p:ph type="title"/>
-          </p:nvPr>
-        </p:nvSpPr>
-        <p:spPr>
-          <a:xfrm>
-            <a:off x="677334" y="609600"/>
-            <a:ext cx="3384712" cy="632791"/>
-          </a:xfrm>
-        </p:spPr>
-        <p:txBody>
-          <a:bodyPr>
-            <a:normAutofit fontScale="90000"/>
-          </a:bodyPr>
-          <a:lstStyle/>
-          <a:p>
-            <a:r>
-              <a:rPr lang="en-US" dirty="0"/>
-              <a:t>Lock Contention</a:t>
+            <a:pPr marL="0" indent="0">
+              <a:buNone/>
+            </a:pPr>
+            <a:r>
+              <a:rPr lang="en-US" sz="2000" dirty="0"/>
+              <a:t>That’s it for the bugs and bug fixes, now let’s move on to two </a:t>
+            </a:r>
+            <a:r>
+              <a:rPr lang="en-US" sz="2000" dirty="0">
+                <a:solidFill>
+                  <a:schemeClr val="accent2">
+                    <a:lumMod val="60000"/>
+                    <a:lumOff val="40000"/>
+                  </a:schemeClr>
+                </a:solidFill>
+              </a:rPr>
+              <a:t>new</a:t>
+            </a:r>
+            <a:r>
+              <a:rPr lang="en-US" sz="2000" dirty="0"/>
+              <a:t> scheduling algorithms. Both of them aim to solve a problem experienced primarily by </a:t>
+            </a:r>
+            <a:r>
+              <a:rPr lang="en-US" sz="2000" dirty="0">
+                <a:solidFill>
+                  <a:schemeClr val="accent2">
+                    <a:lumMod val="60000"/>
+                    <a:lumOff val="40000"/>
+                  </a:schemeClr>
+                </a:solidFill>
+              </a:rPr>
+              <a:t>parallel programs</a:t>
+            </a:r>
+            <a:r>
+              <a:rPr lang="en-US" sz="2000" i="1" dirty="0"/>
+              <a:t> </a:t>
+            </a:r>
+            <a:r>
+              <a:rPr lang="en-US" sz="2000" dirty="0"/>
+              <a:t>on the CFS.</a:t>
+            </a:r>
+          </a:p>
+          <a:p>
+            <a:pPr marL="0" indent="0">
+              <a:buNone/>
+            </a:pPr>
+            <a:endParaRPr lang="en-US" sz="2000" dirty="0"/>
+          </a:p>
+          <a:p>
+            <a:pPr marL="0" indent="0">
+              <a:buNone/>
+            </a:pPr>
+            <a:r>
+              <a:rPr lang="en-US" sz="2000" dirty="0"/>
+              <a:t>This problem is called </a:t>
+            </a:r>
+            <a:r>
+              <a:rPr lang="en-US" sz="2000" i="1" dirty="0">
+                <a:solidFill>
+                  <a:schemeClr val="accent2">
+                    <a:lumMod val="60000"/>
+                    <a:lumOff val="40000"/>
+                  </a:schemeClr>
+                </a:solidFill>
+              </a:rPr>
+              <a:t>Lock contention</a:t>
+            </a:r>
+            <a:r>
+              <a:rPr lang="en-US" sz="2000" dirty="0"/>
+              <a:t>.</a:t>
             </a:r>
           </a:p>
         </p:txBody>
@@ -12820,7 +12857,7 @@
     </p:spTree>
     <p:extLst>
       <p:ext uri="{BB962C8B-B14F-4D97-AF65-F5344CB8AC3E}">
-        <p14:creationId xmlns:p14="http://schemas.microsoft.com/office/powerpoint/2010/main" val="2578763411"/>
+        <p14:creationId xmlns:p14="http://schemas.microsoft.com/office/powerpoint/2010/main" val="1386350663"/>
       </p:ext>
     </p:extLst>
   </p:cSld>
@@ -12849,6 +12886,297 @@
       </p:grpSpPr>
       <p:sp>
         <p:nvSpPr>
+          <p:cNvPr id="3" name="Content Placeholder 2">
+            <a:extLst>
+              <a:ext uri="{FF2B5EF4-FFF2-40B4-BE49-F238E27FC236}">
+                <a16:creationId xmlns:a16="http://schemas.microsoft.com/office/drawing/2014/main" id="{D83E9CED-5A39-49BF-9563-8FD5937C2082}"/>
+              </a:ext>
+            </a:extLst>
+          </p:cNvPr>
+          <p:cNvSpPr>
+            <a:spLocks noGrp="1"/>
+          </p:cNvSpPr>
+          <p:nvPr>
+            <p:ph idx="1"/>
+          </p:nvPr>
+        </p:nvSpPr>
+        <p:spPr>
+          <a:xfrm>
+            <a:off x="592114" y="1242391"/>
+            <a:ext cx="8661216" cy="4591877"/>
+          </a:xfrm>
+        </p:spPr>
+        <p:txBody>
+          <a:bodyPr>
+            <a:normAutofit/>
+          </a:bodyPr>
+          <a:lstStyle/>
+          <a:p>
+            <a:endParaRPr lang="en-US" dirty="0"/>
+          </a:p>
+        </p:txBody>
+      </p:sp>
+      <p:sp>
+        <p:nvSpPr>
+          <p:cNvPr id="15" name="Title 14">
+            <a:extLst>
+              <a:ext uri="{FF2B5EF4-FFF2-40B4-BE49-F238E27FC236}">
+                <a16:creationId xmlns:a16="http://schemas.microsoft.com/office/drawing/2014/main" id="{DD5971B8-AEDF-4A4F-A785-3ABA81D954C9}"/>
+              </a:ext>
+            </a:extLst>
+          </p:cNvPr>
+          <p:cNvSpPr>
+            <a:spLocks noGrp="1"/>
+          </p:cNvSpPr>
+          <p:nvPr>
+            <p:ph type="title"/>
+          </p:nvPr>
+        </p:nvSpPr>
+        <p:spPr>
+          <a:xfrm>
+            <a:off x="677334" y="609600"/>
+            <a:ext cx="3384712" cy="632791"/>
+          </a:xfrm>
+        </p:spPr>
+        <p:txBody>
+          <a:bodyPr>
+            <a:normAutofit fontScale="90000"/>
+          </a:bodyPr>
+          <a:lstStyle/>
+          <a:p>
+            <a:r>
+              <a:rPr lang="en-US" dirty="0"/>
+              <a:t>Lock Contention</a:t>
+            </a:r>
+          </a:p>
+        </p:txBody>
+      </p:sp>
+    </p:spTree>
+    <p:extLst>
+      <p:ext uri="{BB962C8B-B14F-4D97-AF65-F5344CB8AC3E}">
+        <p14:creationId xmlns:p14="http://schemas.microsoft.com/office/powerpoint/2010/main" val="2578763411"/>
+      </p:ext>
+    </p:extLst>
+  </p:cSld>
+  <p:clrMapOvr>
+    <a:masterClrMapping/>
+  </p:clrMapOvr>
+</p:sld>
+</file>
+
+<file path=ppt/slides/slide34.xml><?xml version="1.0" encoding="utf-8"?>
+<p:sld xmlns:a="http://schemas.openxmlformats.org/drawingml/2006/main" xmlns:r="http://schemas.openxmlformats.org/officeDocument/2006/relationships" xmlns:p="http://schemas.openxmlformats.org/presentationml/2006/main">
+  <p:cSld>
+    <p:spTree>
+      <p:nvGrpSpPr>
+        <p:cNvPr id="1" name=""/>
+        <p:cNvGrpSpPr/>
+        <p:nvPr/>
+      </p:nvGrpSpPr>
+      <p:grpSpPr>
+        <a:xfrm>
+          <a:off x="0" y="0"/>
+          <a:ext cx="0" cy="0"/>
+          <a:chOff x="0" y="0"/>
+          <a:chExt cx="0" cy="0"/>
+        </a:xfrm>
+      </p:grpSpPr>
+      <p:sp>
+        <p:nvSpPr>
+          <p:cNvPr id="3" name="Content Placeholder 2">
+            <a:extLst>
+              <a:ext uri="{FF2B5EF4-FFF2-40B4-BE49-F238E27FC236}">
+                <a16:creationId xmlns:a16="http://schemas.microsoft.com/office/drawing/2014/main" id="{D83E9CED-5A39-49BF-9563-8FD5937C2082}"/>
+              </a:ext>
+            </a:extLst>
+          </p:cNvPr>
+          <p:cNvSpPr>
+            <a:spLocks noGrp="1"/>
+          </p:cNvSpPr>
+          <p:nvPr>
+            <p:ph idx="1"/>
+          </p:nvPr>
+        </p:nvSpPr>
+        <p:spPr>
+          <a:xfrm>
+            <a:off x="592114" y="1242391"/>
+            <a:ext cx="8661216" cy="4591877"/>
+          </a:xfrm>
+        </p:spPr>
+        <p:txBody>
+          <a:bodyPr>
+            <a:normAutofit/>
+          </a:bodyPr>
+          <a:lstStyle/>
+          <a:p>
+            <a:endParaRPr lang="en-US" dirty="0"/>
+          </a:p>
+        </p:txBody>
+      </p:sp>
+      <p:sp>
+        <p:nvSpPr>
+          <p:cNvPr id="15" name="Title 14">
+            <a:extLst>
+              <a:ext uri="{FF2B5EF4-FFF2-40B4-BE49-F238E27FC236}">
+                <a16:creationId xmlns:a16="http://schemas.microsoft.com/office/drawing/2014/main" id="{DD5971B8-AEDF-4A4F-A785-3ABA81D954C9}"/>
+              </a:ext>
+            </a:extLst>
+          </p:cNvPr>
+          <p:cNvSpPr>
+            <a:spLocks noGrp="1"/>
+          </p:cNvSpPr>
+          <p:nvPr>
+            <p:ph type="title"/>
+          </p:nvPr>
+        </p:nvSpPr>
+        <p:spPr>
+          <a:xfrm>
+            <a:off x="677334" y="609600"/>
+            <a:ext cx="3384712" cy="632791"/>
+          </a:xfrm>
+        </p:spPr>
+        <p:txBody>
+          <a:bodyPr>
+            <a:normAutofit fontScale="90000"/>
+          </a:bodyPr>
+          <a:lstStyle/>
+          <a:p>
+            <a:r>
+              <a:rPr lang="en-US" dirty="0"/>
+              <a:t>Shuffler</a:t>
+            </a:r>
+          </a:p>
+        </p:txBody>
+      </p:sp>
+    </p:spTree>
+    <p:extLst>
+      <p:ext uri="{BB962C8B-B14F-4D97-AF65-F5344CB8AC3E}">
+        <p14:creationId xmlns:p14="http://schemas.microsoft.com/office/powerpoint/2010/main" val="2301677549"/>
+      </p:ext>
+    </p:extLst>
+  </p:cSld>
+  <p:clrMapOvr>
+    <a:masterClrMapping/>
+  </p:clrMapOvr>
+</p:sld>
+</file>
+
+<file path=ppt/slides/slide35.xml><?xml version="1.0" encoding="utf-8"?>
+<p:sld xmlns:a="http://schemas.openxmlformats.org/drawingml/2006/main" xmlns:r="http://schemas.openxmlformats.org/officeDocument/2006/relationships" xmlns:p="http://schemas.openxmlformats.org/presentationml/2006/main">
+  <p:cSld>
+    <p:spTree>
+      <p:nvGrpSpPr>
+        <p:cNvPr id="1" name=""/>
+        <p:cNvGrpSpPr/>
+        <p:nvPr/>
+      </p:nvGrpSpPr>
+      <p:grpSpPr>
+        <a:xfrm>
+          <a:off x="0" y="0"/>
+          <a:ext cx="0" cy="0"/>
+          <a:chOff x="0" y="0"/>
+          <a:chExt cx="0" cy="0"/>
+        </a:xfrm>
+      </p:grpSpPr>
+      <p:sp>
+        <p:nvSpPr>
+          <p:cNvPr id="3" name="Content Placeholder 2">
+            <a:extLst>
+              <a:ext uri="{FF2B5EF4-FFF2-40B4-BE49-F238E27FC236}">
+                <a16:creationId xmlns:a16="http://schemas.microsoft.com/office/drawing/2014/main" id="{D83E9CED-5A39-49BF-9563-8FD5937C2082}"/>
+              </a:ext>
+            </a:extLst>
+          </p:cNvPr>
+          <p:cNvSpPr>
+            <a:spLocks noGrp="1"/>
+          </p:cNvSpPr>
+          <p:nvPr>
+            <p:ph idx="1"/>
+          </p:nvPr>
+        </p:nvSpPr>
+        <p:spPr>
+          <a:xfrm>
+            <a:off x="592114" y="1242391"/>
+            <a:ext cx="8661216" cy="4591877"/>
+          </a:xfrm>
+        </p:spPr>
+        <p:txBody>
+          <a:bodyPr>
+            <a:normAutofit/>
+          </a:bodyPr>
+          <a:lstStyle/>
+          <a:p>
+            <a:endParaRPr lang="en-US" dirty="0"/>
+          </a:p>
+        </p:txBody>
+      </p:sp>
+      <p:sp>
+        <p:nvSpPr>
+          <p:cNvPr id="15" name="Title 14">
+            <a:extLst>
+              <a:ext uri="{FF2B5EF4-FFF2-40B4-BE49-F238E27FC236}">
+                <a16:creationId xmlns:a16="http://schemas.microsoft.com/office/drawing/2014/main" id="{DD5971B8-AEDF-4A4F-A785-3ABA81D954C9}"/>
+              </a:ext>
+            </a:extLst>
+          </p:cNvPr>
+          <p:cNvSpPr>
+            <a:spLocks noGrp="1"/>
+          </p:cNvSpPr>
+          <p:nvPr>
+            <p:ph type="title"/>
+          </p:nvPr>
+        </p:nvSpPr>
+        <p:spPr>
+          <a:xfrm>
+            <a:off x="677334" y="609600"/>
+            <a:ext cx="3384712" cy="632791"/>
+          </a:xfrm>
+        </p:spPr>
+        <p:txBody>
+          <a:bodyPr>
+            <a:normAutofit fontScale="90000"/>
+          </a:bodyPr>
+          <a:lstStyle/>
+          <a:p>
+            <a:r>
+              <a:rPr lang="en-US" dirty="0"/>
+              <a:t>FLSCHED</a:t>
+            </a:r>
+          </a:p>
+        </p:txBody>
+      </p:sp>
+    </p:spTree>
+    <p:extLst>
+      <p:ext uri="{BB962C8B-B14F-4D97-AF65-F5344CB8AC3E}">
+        <p14:creationId xmlns:p14="http://schemas.microsoft.com/office/powerpoint/2010/main" val="2369188148"/>
+      </p:ext>
+    </p:extLst>
+  </p:cSld>
+  <p:clrMapOvr>
+    <a:masterClrMapping/>
+  </p:clrMapOvr>
+</p:sld>
+</file>
+
+<file path=ppt/slides/slide36.xml><?xml version="1.0" encoding="utf-8"?>
+<p:sld xmlns:a="http://schemas.openxmlformats.org/drawingml/2006/main" xmlns:r="http://schemas.openxmlformats.org/officeDocument/2006/relationships" xmlns:p="http://schemas.openxmlformats.org/presentationml/2006/main">
+  <p:cSld>
+    <p:spTree>
+      <p:nvGrpSpPr>
+        <p:cNvPr id="1" name=""/>
+        <p:cNvGrpSpPr/>
+        <p:nvPr/>
+      </p:nvGrpSpPr>
+      <p:grpSpPr>
+        <a:xfrm>
+          <a:off x="0" y="0"/>
+          <a:ext cx="0" cy="0"/>
+          <a:chOff x="0" y="0"/>
+          <a:chExt cx="0" cy="0"/>
+        </a:xfrm>
+      </p:grpSpPr>
+      <p:sp>
+        <p:nvSpPr>
           <p:cNvPr id="2" name="Title 1">
             <a:extLst>
               <a:ext uri="{FF2B5EF4-FFF2-40B4-BE49-F238E27FC236}">
@@ -12913,7 +13241,7 @@
 </p:sld>
 </file>
 
-<file path=ppt/slides/slide34.xml><?xml version="1.0" encoding="utf-8"?>
+<file path=ppt/slides/slide37.xml><?xml version="1.0" encoding="utf-8"?>
 <p:sld xmlns:a="http://schemas.openxmlformats.org/drawingml/2006/main" xmlns:r="http://schemas.openxmlformats.org/officeDocument/2006/relationships" xmlns:p="http://schemas.openxmlformats.org/presentationml/2006/main">
   <p:cSld>
     <p:spTree>

</xml_diff>